<commit_message>
Update 10.1 Inheritance Approach & Avoid
</commit_message>
<xml_diff>
--- a/Programming 4/10.1 Inheritance Approach & Avoid/10.1 Inheritance Approach and Avoid.pptx
+++ b/Programming 4/10.1 Inheritance Approach & Avoid/10.1 Inheritance Approach and Avoid.pptx
@@ -4,8 +4,18 @@
   <p:sldMasterIdLst>
     <p:sldMasterId id="2147483648" r:id="rId1"/>
   </p:sldMasterIdLst>
+  <p:notesMasterIdLst>
+    <p:notesMasterId r:id="rId10"/>
+  </p:notesMasterIdLst>
   <p:sldIdLst>
-    <p:sldId id="256" r:id="rId2"/>
+    <p:sldId id="257" r:id="rId2"/>
+    <p:sldId id="258" r:id="rId3"/>
+    <p:sldId id="259" r:id="rId4"/>
+    <p:sldId id="260" r:id="rId5"/>
+    <p:sldId id="261" r:id="rId6"/>
+    <p:sldId id="262" r:id="rId7"/>
+    <p:sldId id="263" r:id="rId8"/>
+    <p:sldId id="264" r:id="rId9"/>
   </p:sldIdLst>
   <p:sldSz cx="9144000" cy="6858000" type="screen4x3"/>
   <p:notesSz cx="6858000" cy="9144000"/>
@@ -106,10 +116,1043 @@
   </p:defaultTextStyle>
   <p:extLst>
     <p:ext uri="{EFAFB233-063F-42B5-8137-9DF3F51BA10A}">
-      <p15:sldGuideLst xmlns:p15="http://schemas.microsoft.com/office/powerpoint/2012/main"/>
+      <p15:sldGuideLst xmlns:p15="http://schemas.microsoft.com/office/powerpoint/2012/main">
+        <p15:guide id="1" orient="horz" pos="2160">
+          <p15:clr>
+            <a:srgbClr val="A4A3A4"/>
+          </p15:clr>
+        </p15:guide>
+        <p15:guide id="2" pos="2880">
+          <p15:clr>
+            <a:srgbClr val="A4A3A4"/>
+          </p15:clr>
+        </p15:guide>
+      </p15:sldGuideLst>
     </p:ext>
   </p:extLst>
 </p:presentation>
+</file>
+
+<file path=ppt/notesMasters/notesMaster1.xml><?xml version="1.0" encoding="utf-8"?>
+<p:notesMaster xmlns:a="http://schemas.openxmlformats.org/drawingml/2006/main" xmlns:r="http://schemas.openxmlformats.org/officeDocument/2006/relationships" xmlns:p="http://schemas.openxmlformats.org/presentationml/2006/main">
+  <p:cSld>
+    <p:bg>
+      <p:bgRef idx="1001">
+        <a:schemeClr val="bg1"/>
+      </p:bgRef>
+    </p:bg>
+    <p:spTree>
+      <p:nvGrpSpPr>
+        <p:cNvPr id="1" name=""/>
+        <p:cNvGrpSpPr/>
+        <p:nvPr/>
+      </p:nvGrpSpPr>
+      <p:grpSpPr>
+        <a:xfrm>
+          <a:off x="0" y="0"/>
+          <a:ext cx="0" cy="0"/>
+          <a:chOff x="0" y="0"/>
+          <a:chExt cx="0" cy="0"/>
+        </a:xfrm>
+      </p:grpSpPr>
+      <p:sp>
+        <p:nvSpPr>
+          <p:cNvPr id="2" name="Header Placeholder 1"/>
+          <p:cNvSpPr>
+            <a:spLocks noGrp="1"/>
+          </p:cNvSpPr>
+          <p:nvPr>
+            <p:ph type="hdr" sz="quarter"/>
+          </p:nvPr>
+        </p:nvSpPr>
+        <p:spPr>
+          <a:xfrm>
+            <a:off x="0" y="0"/>
+            <a:ext cx="2971800" cy="458788"/>
+          </a:xfrm>
+          <a:prstGeom prst="rect">
+            <a:avLst/>
+          </a:prstGeom>
+        </p:spPr>
+        <p:txBody>
+          <a:bodyPr vert="horz" lIns="91440" tIns="45720" rIns="91440" bIns="45720" rtlCol="0"/>
+          <a:lstStyle>
+            <a:lvl1pPr algn="l">
+              <a:defRPr sz="1200"/>
+            </a:lvl1pPr>
+          </a:lstStyle>
+          <a:p>
+            <a:endParaRPr lang="en-NZ"/>
+          </a:p>
+        </p:txBody>
+      </p:sp>
+      <p:sp>
+        <p:nvSpPr>
+          <p:cNvPr id="3" name="Date Placeholder 2"/>
+          <p:cNvSpPr>
+            <a:spLocks noGrp="1"/>
+          </p:cNvSpPr>
+          <p:nvPr>
+            <p:ph type="dt" idx="1"/>
+          </p:nvPr>
+        </p:nvSpPr>
+        <p:spPr>
+          <a:xfrm>
+            <a:off x="3884613" y="0"/>
+            <a:ext cx="2971800" cy="458788"/>
+          </a:xfrm>
+          <a:prstGeom prst="rect">
+            <a:avLst/>
+          </a:prstGeom>
+        </p:spPr>
+        <p:txBody>
+          <a:bodyPr vert="horz" lIns="91440" tIns="45720" rIns="91440" bIns="45720" rtlCol="0"/>
+          <a:lstStyle>
+            <a:lvl1pPr algn="r">
+              <a:defRPr sz="1200"/>
+            </a:lvl1pPr>
+          </a:lstStyle>
+          <a:p>
+            <a:fld id="{BA032E96-AFB4-4342-B128-80BEFC0A9F75}" type="datetimeFigureOut">
+              <a:rPr lang="en-NZ" smtClean="0"/>
+              <a:t>24/09/2019</a:t>
+            </a:fld>
+            <a:endParaRPr lang="en-NZ"/>
+          </a:p>
+        </p:txBody>
+      </p:sp>
+      <p:sp>
+        <p:nvSpPr>
+          <p:cNvPr id="4" name="Slide Image Placeholder 3"/>
+          <p:cNvSpPr>
+            <a:spLocks noGrp="1" noRot="1" noChangeAspect="1"/>
+          </p:cNvSpPr>
+          <p:nvPr>
+            <p:ph type="sldImg" idx="2"/>
+          </p:nvPr>
+        </p:nvSpPr>
+        <p:spPr>
+          <a:xfrm>
+            <a:off x="1371600" y="1143000"/>
+            <a:ext cx="4114800" cy="3086100"/>
+          </a:xfrm>
+          <a:prstGeom prst="rect">
+            <a:avLst/>
+          </a:prstGeom>
+          <a:noFill/>
+          <a:ln w="12700">
+            <a:solidFill>
+              <a:prstClr val="black"/>
+            </a:solidFill>
+          </a:ln>
+        </p:spPr>
+        <p:txBody>
+          <a:bodyPr vert="horz" lIns="91440" tIns="45720" rIns="91440" bIns="45720" rtlCol="0" anchor="ctr"/>
+          <a:lstStyle/>
+          <a:p>
+            <a:endParaRPr lang="en-NZ"/>
+          </a:p>
+        </p:txBody>
+      </p:sp>
+      <p:sp>
+        <p:nvSpPr>
+          <p:cNvPr id="5" name="Notes Placeholder 4"/>
+          <p:cNvSpPr>
+            <a:spLocks noGrp="1"/>
+          </p:cNvSpPr>
+          <p:nvPr>
+            <p:ph type="body" sz="quarter" idx="3"/>
+          </p:nvPr>
+        </p:nvSpPr>
+        <p:spPr>
+          <a:xfrm>
+            <a:off x="685800" y="4400550"/>
+            <a:ext cx="5486400" cy="3600450"/>
+          </a:xfrm>
+          <a:prstGeom prst="rect">
+            <a:avLst/>
+          </a:prstGeom>
+        </p:spPr>
+        <p:txBody>
+          <a:bodyPr vert="horz" lIns="91440" tIns="45720" rIns="91440" bIns="45720" rtlCol="0"/>
+          <a:lstStyle/>
+          <a:p>
+            <a:pPr lvl="0"/>
+            <a:r>
+              <a:rPr lang="en-US" smtClean="0"/>
+              <a:t>Edit Master text styles</a:t>
+            </a:r>
+          </a:p>
+          <a:p>
+            <a:pPr lvl="1"/>
+            <a:r>
+              <a:rPr lang="en-US" smtClean="0"/>
+              <a:t>Second level</a:t>
+            </a:r>
+          </a:p>
+          <a:p>
+            <a:pPr lvl="2"/>
+            <a:r>
+              <a:rPr lang="en-US" smtClean="0"/>
+              <a:t>Third level</a:t>
+            </a:r>
+          </a:p>
+          <a:p>
+            <a:pPr lvl="3"/>
+            <a:r>
+              <a:rPr lang="en-US" smtClean="0"/>
+              <a:t>Fourth level</a:t>
+            </a:r>
+          </a:p>
+          <a:p>
+            <a:pPr lvl="4"/>
+            <a:r>
+              <a:rPr lang="en-US" smtClean="0"/>
+              <a:t>Fifth level</a:t>
+            </a:r>
+            <a:endParaRPr lang="en-NZ"/>
+          </a:p>
+        </p:txBody>
+      </p:sp>
+      <p:sp>
+        <p:nvSpPr>
+          <p:cNvPr id="6" name="Footer Placeholder 5"/>
+          <p:cNvSpPr>
+            <a:spLocks noGrp="1"/>
+          </p:cNvSpPr>
+          <p:nvPr>
+            <p:ph type="ftr" sz="quarter" idx="4"/>
+          </p:nvPr>
+        </p:nvSpPr>
+        <p:spPr>
+          <a:xfrm>
+            <a:off x="0" y="8685213"/>
+            <a:ext cx="2971800" cy="458787"/>
+          </a:xfrm>
+          <a:prstGeom prst="rect">
+            <a:avLst/>
+          </a:prstGeom>
+        </p:spPr>
+        <p:txBody>
+          <a:bodyPr vert="horz" lIns="91440" tIns="45720" rIns="91440" bIns="45720" rtlCol="0" anchor="b"/>
+          <a:lstStyle>
+            <a:lvl1pPr algn="l">
+              <a:defRPr sz="1200"/>
+            </a:lvl1pPr>
+          </a:lstStyle>
+          <a:p>
+            <a:endParaRPr lang="en-NZ"/>
+          </a:p>
+        </p:txBody>
+      </p:sp>
+      <p:sp>
+        <p:nvSpPr>
+          <p:cNvPr id="7" name="Slide Number Placeholder 6"/>
+          <p:cNvSpPr>
+            <a:spLocks noGrp="1"/>
+          </p:cNvSpPr>
+          <p:nvPr>
+            <p:ph type="sldNum" sz="quarter" idx="5"/>
+          </p:nvPr>
+        </p:nvSpPr>
+        <p:spPr>
+          <a:xfrm>
+            <a:off x="3884613" y="8685213"/>
+            <a:ext cx="2971800" cy="458787"/>
+          </a:xfrm>
+          <a:prstGeom prst="rect">
+            <a:avLst/>
+          </a:prstGeom>
+        </p:spPr>
+        <p:txBody>
+          <a:bodyPr vert="horz" lIns="91440" tIns="45720" rIns="91440" bIns="45720" rtlCol="0" anchor="b"/>
+          <a:lstStyle>
+            <a:lvl1pPr algn="r">
+              <a:defRPr sz="1200"/>
+            </a:lvl1pPr>
+          </a:lstStyle>
+          <a:p>
+            <a:fld id="{F77E63B8-3238-4BF1-A11D-FAEA78081A49}" type="slidenum">
+              <a:rPr lang="en-NZ" smtClean="0"/>
+              <a:t>‹#›</a:t>
+            </a:fld>
+            <a:endParaRPr lang="en-NZ"/>
+          </a:p>
+        </p:txBody>
+      </p:sp>
+    </p:spTree>
+    <p:extLst>
+      <p:ext uri="{BB962C8B-B14F-4D97-AF65-F5344CB8AC3E}">
+        <p14:creationId xmlns:p14="http://schemas.microsoft.com/office/powerpoint/2010/main" val="834274096"/>
+      </p:ext>
+    </p:extLst>
+  </p:cSld>
+  <p:clrMap bg1="lt1" tx1="dk1" bg2="lt2" tx2="dk2" accent1="accent1" accent2="accent2" accent3="accent3" accent4="accent4" accent5="accent5" accent6="accent6" hlink="hlink" folHlink="folHlink"/>
+  <p:notesStyle>
+    <a:lvl1pPr marL="0" algn="l" defTabSz="914400" rtl="0" eaLnBrk="1" latinLnBrk="0" hangingPunct="1">
+      <a:defRPr sz="1200" kern="1200">
+        <a:solidFill>
+          <a:schemeClr val="tx1"/>
+        </a:solidFill>
+        <a:latin typeface="+mn-lt"/>
+        <a:ea typeface="+mn-ea"/>
+        <a:cs typeface="+mn-cs"/>
+      </a:defRPr>
+    </a:lvl1pPr>
+    <a:lvl2pPr marL="457200" algn="l" defTabSz="914400" rtl="0" eaLnBrk="1" latinLnBrk="0" hangingPunct="1">
+      <a:defRPr sz="1200" kern="1200">
+        <a:solidFill>
+          <a:schemeClr val="tx1"/>
+        </a:solidFill>
+        <a:latin typeface="+mn-lt"/>
+        <a:ea typeface="+mn-ea"/>
+        <a:cs typeface="+mn-cs"/>
+      </a:defRPr>
+    </a:lvl2pPr>
+    <a:lvl3pPr marL="914400" algn="l" defTabSz="914400" rtl="0" eaLnBrk="1" latinLnBrk="0" hangingPunct="1">
+      <a:defRPr sz="1200" kern="1200">
+        <a:solidFill>
+          <a:schemeClr val="tx1"/>
+        </a:solidFill>
+        <a:latin typeface="+mn-lt"/>
+        <a:ea typeface="+mn-ea"/>
+        <a:cs typeface="+mn-cs"/>
+      </a:defRPr>
+    </a:lvl3pPr>
+    <a:lvl4pPr marL="1371600" algn="l" defTabSz="914400" rtl="0" eaLnBrk="1" latinLnBrk="0" hangingPunct="1">
+      <a:defRPr sz="1200" kern="1200">
+        <a:solidFill>
+          <a:schemeClr val="tx1"/>
+        </a:solidFill>
+        <a:latin typeface="+mn-lt"/>
+        <a:ea typeface="+mn-ea"/>
+        <a:cs typeface="+mn-cs"/>
+      </a:defRPr>
+    </a:lvl4pPr>
+    <a:lvl5pPr marL="1828800" algn="l" defTabSz="914400" rtl="0" eaLnBrk="1" latinLnBrk="0" hangingPunct="1">
+      <a:defRPr sz="1200" kern="1200">
+        <a:solidFill>
+          <a:schemeClr val="tx1"/>
+        </a:solidFill>
+        <a:latin typeface="+mn-lt"/>
+        <a:ea typeface="+mn-ea"/>
+        <a:cs typeface="+mn-cs"/>
+      </a:defRPr>
+    </a:lvl5pPr>
+    <a:lvl6pPr marL="2286000" algn="l" defTabSz="914400" rtl="0" eaLnBrk="1" latinLnBrk="0" hangingPunct="1">
+      <a:defRPr sz="1200" kern="1200">
+        <a:solidFill>
+          <a:schemeClr val="tx1"/>
+        </a:solidFill>
+        <a:latin typeface="+mn-lt"/>
+        <a:ea typeface="+mn-ea"/>
+        <a:cs typeface="+mn-cs"/>
+      </a:defRPr>
+    </a:lvl6pPr>
+    <a:lvl7pPr marL="2743200" algn="l" defTabSz="914400" rtl="0" eaLnBrk="1" latinLnBrk="0" hangingPunct="1">
+      <a:defRPr sz="1200" kern="1200">
+        <a:solidFill>
+          <a:schemeClr val="tx1"/>
+        </a:solidFill>
+        <a:latin typeface="+mn-lt"/>
+        <a:ea typeface="+mn-ea"/>
+        <a:cs typeface="+mn-cs"/>
+      </a:defRPr>
+    </a:lvl7pPr>
+    <a:lvl8pPr marL="3200400" algn="l" defTabSz="914400" rtl="0" eaLnBrk="1" latinLnBrk="0" hangingPunct="1">
+      <a:defRPr sz="1200" kern="1200">
+        <a:solidFill>
+          <a:schemeClr val="tx1"/>
+        </a:solidFill>
+        <a:latin typeface="+mn-lt"/>
+        <a:ea typeface="+mn-ea"/>
+        <a:cs typeface="+mn-cs"/>
+      </a:defRPr>
+    </a:lvl8pPr>
+    <a:lvl9pPr marL="3657600" algn="l" defTabSz="914400" rtl="0" eaLnBrk="1" latinLnBrk="0" hangingPunct="1">
+      <a:defRPr sz="1200" kern="1200">
+        <a:solidFill>
+          <a:schemeClr val="tx1"/>
+        </a:solidFill>
+        <a:latin typeface="+mn-lt"/>
+        <a:ea typeface="+mn-ea"/>
+        <a:cs typeface="+mn-cs"/>
+      </a:defRPr>
+    </a:lvl9pPr>
+  </p:notesStyle>
+</p:notesMaster>
+</file>
+
+<file path=ppt/notesSlides/notesSlide1.xml><?xml version="1.0" encoding="utf-8"?>
+<p:notes xmlns:a="http://schemas.openxmlformats.org/drawingml/2006/main" xmlns:r="http://schemas.openxmlformats.org/officeDocument/2006/relationships" xmlns:p="http://schemas.openxmlformats.org/presentationml/2006/main">
+  <p:cSld>
+    <p:spTree>
+      <p:nvGrpSpPr>
+        <p:cNvPr id="1" name=""/>
+        <p:cNvGrpSpPr/>
+        <p:nvPr/>
+      </p:nvGrpSpPr>
+      <p:grpSpPr>
+        <a:xfrm>
+          <a:off x="0" y="0"/>
+          <a:ext cx="0" cy="0"/>
+          <a:chOff x="0" y="0"/>
+          <a:chExt cx="0" cy="0"/>
+        </a:xfrm>
+      </p:grpSpPr>
+      <p:sp>
+        <p:nvSpPr>
+          <p:cNvPr id="2" name="Slide Image Placeholder 1"/>
+          <p:cNvSpPr>
+            <a:spLocks noGrp="1" noRot="1" noChangeAspect="1"/>
+          </p:cNvSpPr>
+          <p:nvPr>
+            <p:ph type="sldImg"/>
+          </p:nvPr>
+        </p:nvSpPr>
+        <p:spPr/>
+      </p:sp>
+      <p:sp>
+        <p:nvSpPr>
+          <p:cNvPr id="3" name="Notes Placeholder 2"/>
+          <p:cNvSpPr>
+            <a:spLocks noGrp="1"/>
+          </p:cNvSpPr>
+          <p:nvPr>
+            <p:ph type="body" idx="1"/>
+          </p:nvPr>
+        </p:nvSpPr>
+        <p:spPr/>
+        <p:txBody>
+          <a:bodyPr/>
+          <a:lstStyle/>
+          <a:p>
+            <a:pPr marL="171450" indent="-171450">
+              <a:buFont typeface="Arial" charset="0"/>
+              <a:buChar char="•"/>
+            </a:pPr>
+            <a:endParaRPr lang="en-NZ" sz="1200" kern="1200" dirty="0" smtClean="0">
+              <a:solidFill>
+                <a:schemeClr val="tx1"/>
+              </a:solidFill>
+              <a:effectLst/>
+              <a:latin typeface="+mn-lt"/>
+              <a:ea typeface="+mn-ea"/>
+              <a:cs typeface="+mn-cs"/>
+            </a:endParaRPr>
+          </a:p>
+        </p:txBody>
+      </p:sp>
+      <p:sp>
+        <p:nvSpPr>
+          <p:cNvPr id="4" name="Slide Number Placeholder 3"/>
+          <p:cNvSpPr>
+            <a:spLocks noGrp="1"/>
+          </p:cNvSpPr>
+          <p:nvPr>
+            <p:ph type="sldNum" sz="quarter" idx="10"/>
+          </p:nvPr>
+        </p:nvSpPr>
+        <p:spPr/>
+        <p:txBody>
+          <a:bodyPr/>
+          <a:lstStyle/>
+          <a:p>
+            <a:fld id="{BBC1DE02-C006-4F38-873D-E62701AB1734}" type="slidenum">
+              <a:rPr lang="en-NZ" smtClean="0"/>
+              <a:t>2</a:t>
+            </a:fld>
+            <a:endParaRPr lang="en-NZ"/>
+          </a:p>
+        </p:txBody>
+      </p:sp>
+    </p:spTree>
+    <p:extLst>
+      <p:ext uri="{BB962C8B-B14F-4D97-AF65-F5344CB8AC3E}">
+        <p14:creationId xmlns:p14="http://schemas.microsoft.com/office/powerpoint/2010/main" val="197159079"/>
+      </p:ext>
+    </p:extLst>
+  </p:cSld>
+  <p:clrMapOvr>
+    <a:masterClrMapping/>
+  </p:clrMapOvr>
+</p:notes>
+</file>
+
+<file path=ppt/notesSlides/notesSlide2.xml><?xml version="1.0" encoding="utf-8"?>
+<p:notes xmlns:a="http://schemas.openxmlformats.org/drawingml/2006/main" xmlns:r="http://schemas.openxmlformats.org/officeDocument/2006/relationships" xmlns:p="http://schemas.openxmlformats.org/presentationml/2006/main">
+  <p:cSld>
+    <p:spTree>
+      <p:nvGrpSpPr>
+        <p:cNvPr id="1" name=""/>
+        <p:cNvGrpSpPr/>
+        <p:nvPr/>
+      </p:nvGrpSpPr>
+      <p:grpSpPr>
+        <a:xfrm>
+          <a:off x="0" y="0"/>
+          <a:ext cx="0" cy="0"/>
+          <a:chOff x="0" y="0"/>
+          <a:chExt cx="0" cy="0"/>
+        </a:xfrm>
+      </p:grpSpPr>
+      <p:sp>
+        <p:nvSpPr>
+          <p:cNvPr id="2" name="Slide Image Placeholder 1"/>
+          <p:cNvSpPr>
+            <a:spLocks noGrp="1" noRot="1" noChangeAspect="1"/>
+          </p:cNvSpPr>
+          <p:nvPr>
+            <p:ph type="sldImg"/>
+          </p:nvPr>
+        </p:nvSpPr>
+        <p:spPr/>
+      </p:sp>
+      <p:sp>
+        <p:nvSpPr>
+          <p:cNvPr id="3" name="Notes Placeholder 2"/>
+          <p:cNvSpPr>
+            <a:spLocks noGrp="1"/>
+          </p:cNvSpPr>
+          <p:nvPr>
+            <p:ph type="body" idx="1"/>
+          </p:nvPr>
+        </p:nvSpPr>
+        <p:spPr/>
+        <p:txBody>
+          <a:bodyPr/>
+          <a:lstStyle/>
+          <a:p>
+            <a:pPr marL="171450" indent="-171450">
+              <a:buFont typeface="Arial" charset="0"/>
+              <a:buChar char="•"/>
+            </a:pPr>
+            <a:endParaRPr lang="en-NZ" sz="1200" kern="1200" dirty="0" smtClean="0">
+              <a:solidFill>
+                <a:schemeClr val="tx1"/>
+              </a:solidFill>
+              <a:effectLst/>
+              <a:latin typeface="+mn-lt"/>
+              <a:ea typeface="+mn-ea"/>
+              <a:cs typeface="+mn-cs"/>
+            </a:endParaRPr>
+          </a:p>
+        </p:txBody>
+      </p:sp>
+      <p:sp>
+        <p:nvSpPr>
+          <p:cNvPr id="4" name="Slide Number Placeholder 3"/>
+          <p:cNvSpPr>
+            <a:spLocks noGrp="1"/>
+          </p:cNvSpPr>
+          <p:nvPr>
+            <p:ph type="sldNum" sz="quarter" idx="10"/>
+          </p:nvPr>
+        </p:nvSpPr>
+        <p:spPr/>
+        <p:txBody>
+          <a:bodyPr/>
+          <a:lstStyle/>
+          <a:p>
+            <a:fld id="{BBC1DE02-C006-4F38-873D-E62701AB1734}" type="slidenum">
+              <a:rPr lang="en-NZ" smtClean="0"/>
+              <a:t>3</a:t>
+            </a:fld>
+            <a:endParaRPr lang="en-NZ"/>
+          </a:p>
+        </p:txBody>
+      </p:sp>
+    </p:spTree>
+    <p:extLst>
+      <p:ext uri="{BB962C8B-B14F-4D97-AF65-F5344CB8AC3E}">
+        <p14:creationId xmlns:p14="http://schemas.microsoft.com/office/powerpoint/2010/main" val="3389477614"/>
+      </p:ext>
+    </p:extLst>
+  </p:cSld>
+  <p:clrMapOvr>
+    <a:masterClrMapping/>
+  </p:clrMapOvr>
+</p:notes>
+</file>
+
+<file path=ppt/notesSlides/notesSlide3.xml><?xml version="1.0" encoding="utf-8"?>
+<p:notes xmlns:a="http://schemas.openxmlformats.org/drawingml/2006/main" xmlns:r="http://schemas.openxmlformats.org/officeDocument/2006/relationships" xmlns:p="http://schemas.openxmlformats.org/presentationml/2006/main">
+  <p:cSld>
+    <p:spTree>
+      <p:nvGrpSpPr>
+        <p:cNvPr id="1" name=""/>
+        <p:cNvGrpSpPr/>
+        <p:nvPr/>
+      </p:nvGrpSpPr>
+      <p:grpSpPr>
+        <a:xfrm>
+          <a:off x="0" y="0"/>
+          <a:ext cx="0" cy="0"/>
+          <a:chOff x="0" y="0"/>
+          <a:chExt cx="0" cy="0"/>
+        </a:xfrm>
+      </p:grpSpPr>
+      <p:sp>
+        <p:nvSpPr>
+          <p:cNvPr id="2" name="Slide Image Placeholder 1"/>
+          <p:cNvSpPr>
+            <a:spLocks noGrp="1" noRot="1" noChangeAspect="1"/>
+          </p:cNvSpPr>
+          <p:nvPr>
+            <p:ph type="sldImg"/>
+          </p:nvPr>
+        </p:nvSpPr>
+        <p:spPr/>
+      </p:sp>
+      <p:sp>
+        <p:nvSpPr>
+          <p:cNvPr id="3" name="Notes Placeholder 2"/>
+          <p:cNvSpPr>
+            <a:spLocks noGrp="1"/>
+          </p:cNvSpPr>
+          <p:nvPr>
+            <p:ph type="body" idx="1"/>
+          </p:nvPr>
+        </p:nvSpPr>
+        <p:spPr/>
+        <p:txBody>
+          <a:bodyPr/>
+          <a:lstStyle/>
+          <a:p>
+            <a:pPr marL="171450" indent="-171450">
+              <a:buFont typeface="Arial" charset="0"/>
+              <a:buChar char="•"/>
+            </a:pPr>
+            <a:endParaRPr lang="en-NZ" sz="1200" kern="1200" dirty="0" smtClean="0">
+              <a:solidFill>
+                <a:schemeClr val="tx1"/>
+              </a:solidFill>
+              <a:effectLst/>
+              <a:latin typeface="+mn-lt"/>
+              <a:ea typeface="+mn-ea"/>
+              <a:cs typeface="+mn-cs"/>
+            </a:endParaRPr>
+          </a:p>
+        </p:txBody>
+      </p:sp>
+      <p:sp>
+        <p:nvSpPr>
+          <p:cNvPr id="4" name="Slide Number Placeholder 3"/>
+          <p:cNvSpPr>
+            <a:spLocks noGrp="1"/>
+          </p:cNvSpPr>
+          <p:nvPr>
+            <p:ph type="sldNum" sz="quarter" idx="10"/>
+          </p:nvPr>
+        </p:nvSpPr>
+        <p:spPr/>
+        <p:txBody>
+          <a:bodyPr/>
+          <a:lstStyle/>
+          <a:p>
+            <a:fld id="{BBC1DE02-C006-4F38-873D-E62701AB1734}" type="slidenum">
+              <a:rPr lang="en-NZ" smtClean="0"/>
+              <a:t>4</a:t>
+            </a:fld>
+            <a:endParaRPr lang="en-NZ"/>
+          </a:p>
+        </p:txBody>
+      </p:sp>
+    </p:spTree>
+    <p:extLst>
+      <p:ext uri="{BB962C8B-B14F-4D97-AF65-F5344CB8AC3E}">
+        <p14:creationId xmlns:p14="http://schemas.microsoft.com/office/powerpoint/2010/main" val="1925759144"/>
+      </p:ext>
+    </p:extLst>
+  </p:cSld>
+  <p:clrMapOvr>
+    <a:masterClrMapping/>
+  </p:clrMapOvr>
+</p:notes>
+</file>
+
+<file path=ppt/notesSlides/notesSlide4.xml><?xml version="1.0" encoding="utf-8"?>
+<p:notes xmlns:a="http://schemas.openxmlformats.org/drawingml/2006/main" xmlns:r="http://schemas.openxmlformats.org/officeDocument/2006/relationships" xmlns:p="http://schemas.openxmlformats.org/presentationml/2006/main">
+  <p:cSld>
+    <p:spTree>
+      <p:nvGrpSpPr>
+        <p:cNvPr id="1" name=""/>
+        <p:cNvGrpSpPr/>
+        <p:nvPr/>
+      </p:nvGrpSpPr>
+      <p:grpSpPr>
+        <a:xfrm>
+          <a:off x="0" y="0"/>
+          <a:ext cx="0" cy="0"/>
+          <a:chOff x="0" y="0"/>
+          <a:chExt cx="0" cy="0"/>
+        </a:xfrm>
+      </p:grpSpPr>
+      <p:sp>
+        <p:nvSpPr>
+          <p:cNvPr id="2" name="Slide Image Placeholder 1"/>
+          <p:cNvSpPr>
+            <a:spLocks noGrp="1" noRot="1" noChangeAspect="1"/>
+          </p:cNvSpPr>
+          <p:nvPr>
+            <p:ph type="sldImg"/>
+          </p:nvPr>
+        </p:nvSpPr>
+        <p:spPr/>
+      </p:sp>
+      <p:sp>
+        <p:nvSpPr>
+          <p:cNvPr id="3" name="Notes Placeholder 2"/>
+          <p:cNvSpPr>
+            <a:spLocks noGrp="1"/>
+          </p:cNvSpPr>
+          <p:nvPr>
+            <p:ph type="body" idx="1"/>
+          </p:nvPr>
+        </p:nvSpPr>
+        <p:spPr/>
+        <p:txBody>
+          <a:bodyPr/>
+          <a:lstStyle/>
+          <a:p>
+            <a:pPr marL="171450" indent="-171450">
+              <a:buFont typeface="Arial" charset="0"/>
+              <a:buChar char="•"/>
+            </a:pPr>
+            <a:endParaRPr lang="en-NZ" sz="1200" kern="1200" dirty="0" smtClean="0">
+              <a:solidFill>
+                <a:schemeClr val="tx1"/>
+              </a:solidFill>
+              <a:effectLst/>
+              <a:latin typeface="+mn-lt"/>
+              <a:ea typeface="+mn-ea"/>
+              <a:cs typeface="+mn-cs"/>
+            </a:endParaRPr>
+          </a:p>
+        </p:txBody>
+      </p:sp>
+      <p:sp>
+        <p:nvSpPr>
+          <p:cNvPr id="4" name="Slide Number Placeholder 3"/>
+          <p:cNvSpPr>
+            <a:spLocks noGrp="1"/>
+          </p:cNvSpPr>
+          <p:nvPr>
+            <p:ph type="sldNum" sz="quarter" idx="10"/>
+          </p:nvPr>
+        </p:nvSpPr>
+        <p:spPr/>
+        <p:txBody>
+          <a:bodyPr/>
+          <a:lstStyle/>
+          <a:p>
+            <a:fld id="{BBC1DE02-C006-4F38-873D-E62701AB1734}" type="slidenum">
+              <a:rPr lang="en-NZ" smtClean="0"/>
+              <a:t>5</a:t>
+            </a:fld>
+            <a:endParaRPr lang="en-NZ"/>
+          </a:p>
+        </p:txBody>
+      </p:sp>
+    </p:spTree>
+    <p:extLst>
+      <p:ext uri="{BB962C8B-B14F-4D97-AF65-F5344CB8AC3E}">
+        <p14:creationId xmlns:p14="http://schemas.microsoft.com/office/powerpoint/2010/main" val="1814164490"/>
+      </p:ext>
+    </p:extLst>
+  </p:cSld>
+  <p:clrMapOvr>
+    <a:masterClrMapping/>
+  </p:clrMapOvr>
+</p:notes>
+</file>
+
+<file path=ppt/notesSlides/notesSlide5.xml><?xml version="1.0" encoding="utf-8"?>
+<p:notes xmlns:a="http://schemas.openxmlformats.org/drawingml/2006/main" xmlns:r="http://schemas.openxmlformats.org/officeDocument/2006/relationships" xmlns:p="http://schemas.openxmlformats.org/presentationml/2006/main">
+  <p:cSld>
+    <p:spTree>
+      <p:nvGrpSpPr>
+        <p:cNvPr id="1" name=""/>
+        <p:cNvGrpSpPr/>
+        <p:nvPr/>
+      </p:nvGrpSpPr>
+      <p:grpSpPr>
+        <a:xfrm>
+          <a:off x="0" y="0"/>
+          <a:ext cx="0" cy="0"/>
+          <a:chOff x="0" y="0"/>
+          <a:chExt cx="0" cy="0"/>
+        </a:xfrm>
+      </p:grpSpPr>
+      <p:sp>
+        <p:nvSpPr>
+          <p:cNvPr id="2" name="Slide Image Placeholder 1"/>
+          <p:cNvSpPr>
+            <a:spLocks noGrp="1" noRot="1" noChangeAspect="1"/>
+          </p:cNvSpPr>
+          <p:nvPr>
+            <p:ph type="sldImg"/>
+          </p:nvPr>
+        </p:nvSpPr>
+        <p:spPr/>
+      </p:sp>
+      <p:sp>
+        <p:nvSpPr>
+          <p:cNvPr id="3" name="Notes Placeholder 2"/>
+          <p:cNvSpPr>
+            <a:spLocks noGrp="1"/>
+          </p:cNvSpPr>
+          <p:nvPr>
+            <p:ph type="body" idx="1"/>
+          </p:nvPr>
+        </p:nvSpPr>
+        <p:spPr/>
+        <p:txBody>
+          <a:bodyPr/>
+          <a:lstStyle/>
+          <a:p>
+            <a:pPr marL="171450" indent="-171450">
+              <a:buFont typeface="Arial" charset="0"/>
+              <a:buChar char="•"/>
+            </a:pPr>
+            <a:endParaRPr lang="en-NZ" sz="1200" kern="1200" dirty="0" smtClean="0">
+              <a:solidFill>
+                <a:schemeClr val="tx1"/>
+              </a:solidFill>
+              <a:effectLst/>
+              <a:latin typeface="+mn-lt"/>
+              <a:ea typeface="+mn-ea"/>
+              <a:cs typeface="+mn-cs"/>
+            </a:endParaRPr>
+          </a:p>
+        </p:txBody>
+      </p:sp>
+      <p:sp>
+        <p:nvSpPr>
+          <p:cNvPr id="4" name="Slide Number Placeholder 3"/>
+          <p:cNvSpPr>
+            <a:spLocks noGrp="1"/>
+          </p:cNvSpPr>
+          <p:nvPr>
+            <p:ph type="sldNum" sz="quarter" idx="10"/>
+          </p:nvPr>
+        </p:nvSpPr>
+        <p:spPr/>
+        <p:txBody>
+          <a:bodyPr/>
+          <a:lstStyle/>
+          <a:p>
+            <a:fld id="{BBC1DE02-C006-4F38-873D-E62701AB1734}" type="slidenum">
+              <a:rPr lang="en-NZ" smtClean="0"/>
+              <a:t>6</a:t>
+            </a:fld>
+            <a:endParaRPr lang="en-NZ"/>
+          </a:p>
+        </p:txBody>
+      </p:sp>
+    </p:spTree>
+    <p:extLst>
+      <p:ext uri="{BB962C8B-B14F-4D97-AF65-F5344CB8AC3E}">
+        <p14:creationId xmlns:p14="http://schemas.microsoft.com/office/powerpoint/2010/main" val="1164945592"/>
+      </p:ext>
+    </p:extLst>
+  </p:cSld>
+  <p:clrMapOvr>
+    <a:masterClrMapping/>
+  </p:clrMapOvr>
+</p:notes>
+</file>
+
+<file path=ppt/notesSlides/notesSlide6.xml><?xml version="1.0" encoding="utf-8"?>
+<p:notes xmlns:a="http://schemas.openxmlformats.org/drawingml/2006/main" xmlns:r="http://schemas.openxmlformats.org/officeDocument/2006/relationships" xmlns:p="http://schemas.openxmlformats.org/presentationml/2006/main">
+  <p:cSld>
+    <p:spTree>
+      <p:nvGrpSpPr>
+        <p:cNvPr id="1" name=""/>
+        <p:cNvGrpSpPr/>
+        <p:nvPr/>
+      </p:nvGrpSpPr>
+      <p:grpSpPr>
+        <a:xfrm>
+          <a:off x="0" y="0"/>
+          <a:ext cx="0" cy="0"/>
+          <a:chOff x="0" y="0"/>
+          <a:chExt cx="0" cy="0"/>
+        </a:xfrm>
+      </p:grpSpPr>
+      <p:sp>
+        <p:nvSpPr>
+          <p:cNvPr id="2" name="Slide Image Placeholder 1"/>
+          <p:cNvSpPr>
+            <a:spLocks noGrp="1" noRot="1" noChangeAspect="1"/>
+          </p:cNvSpPr>
+          <p:nvPr>
+            <p:ph type="sldImg"/>
+          </p:nvPr>
+        </p:nvSpPr>
+        <p:spPr/>
+      </p:sp>
+      <p:sp>
+        <p:nvSpPr>
+          <p:cNvPr id="3" name="Notes Placeholder 2"/>
+          <p:cNvSpPr>
+            <a:spLocks noGrp="1"/>
+          </p:cNvSpPr>
+          <p:nvPr>
+            <p:ph type="body" idx="1"/>
+          </p:nvPr>
+        </p:nvSpPr>
+        <p:spPr/>
+        <p:txBody>
+          <a:bodyPr/>
+          <a:lstStyle/>
+          <a:p>
+            <a:pPr marL="171450" indent="-171450">
+              <a:buFont typeface="Arial" charset="0"/>
+              <a:buChar char="•"/>
+            </a:pPr>
+            <a:endParaRPr lang="en-NZ" sz="1200" kern="1200" dirty="0" smtClean="0">
+              <a:solidFill>
+                <a:schemeClr val="tx1"/>
+              </a:solidFill>
+              <a:effectLst/>
+              <a:latin typeface="+mn-lt"/>
+              <a:ea typeface="+mn-ea"/>
+              <a:cs typeface="+mn-cs"/>
+            </a:endParaRPr>
+          </a:p>
+        </p:txBody>
+      </p:sp>
+      <p:sp>
+        <p:nvSpPr>
+          <p:cNvPr id="4" name="Slide Number Placeholder 3"/>
+          <p:cNvSpPr>
+            <a:spLocks noGrp="1"/>
+          </p:cNvSpPr>
+          <p:nvPr>
+            <p:ph type="sldNum" sz="quarter" idx="10"/>
+          </p:nvPr>
+        </p:nvSpPr>
+        <p:spPr/>
+        <p:txBody>
+          <a:bodyPr/>
+          <a:lstStyle/>
+          <a:p>
+            <a:fld id="{BBC1DE02-C006-4F38-873D-E62701AB1734}" type="slidenum">
+              <a:rPr lang="en-NZ" smtClean="0"/>
+              <a:t>7</a:t>
+            </a:fld>
+            <a:endParaRPr lang="en-NZ"/>
+          </a:p>
+        </p:txBody>
+      </p:sp>
+    </p:spTree>
+    <p:extLst>
+      <p:ext uri="{BB962C8B-B14F-4D97-AF65-F5344CB8AC3E}">
+        <p14:creationId xmlns:p14="http://schemas.microsoft.com/office/powerpoint/2010/main" val="3085798134"/>
+      </p:ext>
+    </p:extLst>
+  </p:cSld>
+  <p:clrMapOvr>
+    <a:masterClrMapping/>
+  </p:clrMapOvr>
+</p:notes>
+</file>
+
+<file path=ppt/notesSlides/notesSlide7.xml><?xml version="1.0" encoding="utf-8"?>
+<p:notes xmlns:a="http://schemas.openxmlformats.org/drawingml/2006/main" xmlns:r="http://schemas.openxmlformats.org/officeDocument/2006/relationships" xmlns:p="http://schemas.openxmlformats.org/presentationml/2006/main">
+  <p:cSld>
+    <p:spTree>
+      <p:nvGrpSpPr>
+        <p:cNvPr id="1" name=""/>
+        <p:cNvGrpSpPr/>
+        <p:nvPr/>
+      </p:nvGrpSpPr>
+      <p:grpSpPr>
+        <a:xfrm>
+          <a:off x="0" y="0"/>
+          <a:ext cx="0" cy="0"/>
+          <a:chOff x="0" y="0"/>
+          <a:chExt cx="0" cy="0"/>
+        </a:xfrm>
+      </p:grpSpPr>
+      <p:sp>
+        <p:nvSpPr>
+          <p:cNvPr id="2" name="Slide Image Placeholder 1"/>
+          <p:cNvSpPr>
+            <a:spLocks noGrp="1" noRot="1" noChangeAspect="1"/>
+          </p:cNvSpPr>
+          <p:nvPr>
+            <p:ph type="sldImg"/>
+          </p:nvPr>
+        </p:nvSpPr>
+        <p:spPr/>
+      </p:sp>
+      <p:sp>
+        <p:nvSpPr>
+          <p:cNvPr id="3" name="Notes Placeholder 2"/>
+          <p:cNvSpPr>
+            <a:spLocks noGrp="1"/>
+          </p:cNvSpPr>
+          <p:nvPr>
+            <p:ph type="body" idx="1"/>
+          </p:nvPr>
+        </p:nvSpPr>
+        <p:spPr/>
+        <p:txBody>
+          <a:bodyPr/>
+          <a:lstStyle/>
+          <a:p>
+            <a:pPr marL="171450" indent="-171450">
+              <a:buFont typeface="Arial" charset="0"/>
+              <a:buChar char="•"/>
+            </a:pPr>
+            <a:endParaRPr lang="en-NZ" sz="1200" kern="1200" dirty="0" smtClean="0">
+              <a:solidFill>
+                <a:schemeClr val="tx1"/>
+              </a:solidFill>
+              <a:effectLst/>
+              <a:latin typeface="+mn-lt"/>
+              <a:ea typeface="+mn-ea"/>
+              <a:cs typeface="+mn-cs"/>
+            </a:endParaRPr>
+          </a:p>
+        </p:txBody>
+      </p:sp>
+      <p:sp>
+        <p:nvSpPr>
+          <p:cNvPr id="4" name="Slide Number Placeholder 3"/>
+          <p:cNvSpPr>
+            <a:spLocks noGrp="1"/>
+          </p:cNvSpPr>
+          <p:nvPr>
+            <p:ph type="sldNum" sz="quarter" idx="10"/>
+          </p:nvPr>
+        </p:nvSpPr>
+        <p:spPr/>
+        <p:txBody>
+          <a:bodyPr/>
+          <a:lstStyle/>
+          <a:p>
+            <a:fld id="{BBC1DE02-C006-4F38-873D-E62701AB1734}" type="slidenum">
+              <a:rPr lang="en-NZ" smtClean="0"/>
+              <a:t>8</a:t>
+            </a:fld>
+            <a:endParaRPr lang="en-NZ"/>
+          </a:p>
+        </p:txBody>
+      </p:sp>
+    </p:spTree>
+    <p:extLst>
+      <p:ext uri="{BB962C8B-B14F-4D97-AF65-F5344CB8AC3E}">
+        <p14:creationId xmlns:p14="http://schemas.microsoft.com/office/powerpoint/2010/main" val="481793236"/>
+      </p:ext>
+    </p:extLst>
+  </p:cSld>
+  <p:clrMapOvr>
+    <a:masterClrMapping/>
+  </p:clrMapOvr>
+</p:notes>
 </file>
 
 <file path=ppt/slideLayouts/slideLayout1.xml><?xml version="1.0" encoding="utf-8"?>
@@ -293,7 +1336,7 @@
           <a:p>
             <a:fld id="{F8166F1F-CE9B-4651-A6AA-CD717754106B}" type="datetimeFigureOut">
               <a:rPr lang="en-US" smtClean="0"/>
-              <a:t>7/1/2019</a:t>
+              <a:t>9/24/2019</a:t>
             </a:fld>
             <a:endParaRPr lang="en-US"/>
           </a:p>
@@ -458,7 +1501,7 @@
           <a:p>
             <a:fld id="{A76116CE-C4A3-4A05-B2D7-7C2E9A889C0F}" type="datetimeFigureOut">
               <a:rPr lang="en-US" smtClean="0"/>
-              <a:t>1/30/2017</a:t>
+              <a:t>9/24/2019</a:t>
             </a:fld>
             <a:endParaRPr lang="en-US"/>
           </a:p>
@@ -633,7 +1676,7 @@
           <a:p>
             <a:fld id="{A76116CE-C4A3-4A05-B2D7-7C2E9A889C0F}" type="datetimeFigureOut">
               <a:rPr lang="en-US" smtClean="0"/>
-              <a:t>1/30/2017</a:t>
+              <a:t>9/24/2019</a:t>
             </a:fld>
             <a:endParaRPr lang="en-US"/>
           </a:p>
@@ -800,7 +1843,7 @@
           <a:p>
             <a:fld id="{A76116CE-C4A3-4A05-B2D7-7C2E9A889C0F}" type="datetimeFigureOut">
               <a:rPr lang="en-US" smtClean="0"/>
-              <a:t>7/1/2019</a:t>
+              <a:t>9/24/2019</a:t>
             </a:fld>
             <a:endParaRPr lang="en-US"/>
           </a:p>
@@ -1041,7 +2084,7 @@
           <a:p>
             <a:fld id="{A76116CE-C4A3-4A05-B2D7-7C2E9A889C0F}" type="datetimeFigureOut">
               <a:rPr lang="en-US" smtClean="0"/>
-              <a:t>7/1/2019</a:t>
+              <a:t>9/24/2019</a:t>
             </a:fld>
             <a:endParaRPr lang="en-US"/>
           </a:p>
@@ -1324,7 +2367,7 @@
           <a:p>
             <a:fld id="{A76116CE-C4A3-4A05-B2D7-7C2E9A889C0F}" type="datetimeFigureOut">
               <a:rPr lang="en-US" smtClean="0"/>
-              <a:t>1/30/2017</a:t>
+              <a:t>9/24/2019</a:t>
             </a:fld>
             <a:endParaRPr lang="en-US"/>
           </a:p>
@@ -1741,7 +2784,7 @@
           <a:p>
             <a:fld id="{A76116CE-C4A3-4A05-B2D7-7C2E9A889C0F}" type="datetimeFigureOut">
               <a:rPr lang="en-US" smtClean="0"/>
-              <a:t>1/30/2017</a:t>
+              <a:t>9/24/2019</a:t>
             </a:fld>
             <a:endParaRPr lang="en-US"/>
           </a:p>
@@ -1854,7 +2897,7 @@
           <a:p>
             <a:fld id="{A76116CE-C4A3-4A05-B2D7-7C2E9A889C0F}" type="datetimeFigureOut">
               <a:rPr lang="en-US" smtClean="0"/>
-              <a:t>1/30/2017</a:t>
+              <a:t>9/24/2019</a:t>
             </a:fld>
             <a:endParaRPr lang="en-US"/>
           </a:p>
@@ -1944,7 +2987,7 @@
           <a:p>
             <a:fld id="{A76116CE-C4A3-4A05-B2D7-7C2E9A889C0F}" type="datetimeFigureOut">
               <a:rPr lang="en-US" smtClean="0"/>
-              <a:t>1/30/2017</a:t>
+              <a:t>9/24/2019</a:t>
             </a:fld>
             <a:endParaRPr lang="en-US"/>
           </a:p>
@@ -2216,7 +3259,7 @@
           <a:p>
             <a:fld id="{A76116CE-C4A3-4A05-B2D7-7C2E9A889C0F}" type="datetimeFigureOut">
               <a:rPr lang="en-US" smtClean="0"/>
-              <a:t>1/30/2017</a:t>
+              <a:t>9/24/2019</a:t>
             </a:fld>
             <a:endParaRPr lang="en-US"/>
           </a:p>
@@ -2464,7 +3507,7 @@
           <a:p>
             <a:fld id="{A76116CE-C4A3-4A05-B2D7-7C2E9A889C0F}" type="datetimeFigureOut">
               <a:rPr lang="en-US" smtClean="0"/>
-              <a:t>1/30/2017</a:t>
+              <a:t>9/24/2019</a:t>
             </a:fld>
             <a:endParaRPr lang="en-US"/>
           </a:p>
@@ -2672,7 +3715,7 @@
           <a:p>
             <a:fld id="{F8166F1F-CE9B-4651-A6AA-CD717754106B}" type="datetimeFigureOut">
               <a:rPr lang="en-US" smtClean="0"/>
-              <a:t>6/13/2013</a:t>
+              <a:t>9/24/2019</a:t>
             </a:fld>
             <a:endParaRPr lang="en-US"/>
           </a:p>
@@ -2750,7 +3793,7 @@
           <a:p>
             <a:fld id="{F7021451-1387-4CA6-816F-3879F97B5CBC}" type="slidenum">
               <a:rPr lang="en-US" smtClean="0"/>
-              <a:t>�#�</a:t>
+              <a:t>‹#›</a:t>
             </a:fld>
             <a:endParaRPr lang="en-US"/>
           </a:p>
@@ -2761,16 +3804,16 @@
   <p:clrMap bg1="lt1" tx1="dk1" bg2="lt2" tx2="dk2" accent1="accent1" accent2="accent2" accent3="accent3" accent4="accent4" accent5="accent5" accent6="accent6" hlink="hlink" folHlink="folHlink"/>
   <p:sldLayoutIdLst>
     <p:sldLayoutId id="2147483649" r:id="rId1"/>
-    <p:sldLayoutId id="2147483650" r:id="rId3"/>
-    <p:sldLayoutId id="2147483651" r:id="rId4"/>
-    <p:sldLayoutId id="2147483652" r:id="rId5"/>
-    <p:sldLayoutId id="2147483653" r:id="rId6"/>
-    <p:sldLayoutId id="2147483654" r:id="rId7"/>
-    <p:sldLayoutId id="2147483655" r:id="rId8"/>
-    <p:sldLayoutId id="2147483656" r:id="rId9"/>
-    <p:sldLayoutId id="2147483657" r:id="rId10"/>
-    <p:sldLayoutId id="2147483658" r:id="rId11"/>
-    <p:sldLayoutId id="2147483659" r:id="rId12"/>
+    <p:sldLayoutId id="2147483650" r:id="rId2"/>
+    <p:sldLayoutId id="2147483651" r:id="rId3"/>
+    <p:sldLayoutId id="2147483652" r:id="rId4"/>
+    <p:sldLayoutId id="2147483653" r:id="rId5"/>
+    <p:sldLayoutId id="2147483654" r:id="rId6"/>
+    <p:sldLayoutId id="2147483655" r:id="rId7"/>
+    <p:sldLayoutId id="2147483656" r:id="rId8"/>
+    <p:sldLayoutId id="2147483657" r:id="rId9"/>
+    <p:sldLayoutId id="2147483658" r:id="rId10"/>
+    <p:sldLayoutId id="2147483659" r:id="rId11"/>
   </p:sldLayoutIdLst>
   <p:txStyles>
     <p:titleStyle>
@@ -3027,7 +4070,18 @@
 
 <file path=ppt/slides/slide1.xml><?xml version="1.0" encoding="utf-8"?>
 <p:sld xmlns:a="http://schemas.openxmlformats.org/drawingml/2006/main" xmlns:r="http://schemas.openxmlformats.org/officeDocument/2006/relationships" xmlns:p="http://schemas.openxmlformats.org/presentationml/2006/main">
-  <p:cSld name="Title Slide">
+  <p:cSld>
+    <p:bg>
+      <p:bgPr>
+        <a:solidFill>
+          <a:schemeClr val="accent5">
+            <a:lumMod val="60000"/>
+            <a:lumOff val="40000"/>
+          </a:schemeClr>
+        </a:solidFill>
+        <a:effectLst/>
+      </p:bgPr>
+    </p:bg>
     <p:spTree>
       <p:nvGrpSpPr>
         <p:cNvPr id="1" name=""/>
@@ -3044,202 +4098,1556 @@
       </p:grpSpPr>
       <p:sp>
         <p:nvSpPr>
-          <p:cNvPr id="2" name="Title 1"/>
-          <p:cNvSpPr>
-            <a:spLocks noGrp="1"/>
-          </p:cNvSpPr>
-          <p:nvPr>
-            <p:ph type="ctrTitle"/>
-          </p:nvPr>
+          <p:cNvPr id="2" name="Rectangle 1"/>
+          <p:cNvSpPr/>
+          <p:nvPr/>
         </p:nvSpPr>
         <p:spPr>
           <a:xfrm>
-            <a:off x="685800" y="2130425"/>
-            <a:ext cx="7772400" cy="1470025"/>
+            <a:off x="0" y="2133600"/>
+            <a:ext cx="9144000" cy="2300630"/>
           </a:xfrm>
+          <a:prstGeom prst="rect">
+            <a:avLst/>
+          </a:prstGeom>
+          <a:noFill/>
         </p:spPr>
         <p:txBody>
-          <a:bodyPr/>
-          <a:lstStyle/>
-          <a:p>
-            <a:r>
-              <a:rPr lang="en-US" smtClean="0"/>
-              <a:t>Click to edit Master title style</a:t>
-            </a:r>
-            <a:endParaRPr lang="en-US"/>
-          </a:p>
-        </p:txBody>
-      </p:sp>
-      <p:sp>
-        <p:nvSpPr>
-          <p:cNvPr id="3" name="Subtitle 2"/>
-          <p:cNvSpPr>
-            <a:spLocks noGrp="1"/>
-          </p:cNvSpPr>
-          <p:nvPr>
-            <p:ph type="subTitle" idx="1"/>
-          </p:nvPr>
-        </p:nvSpPr>
-        <p:spPr>
-          <a:xfrm>
-            <a:off x="1371600" y="3886200"/>
-            <a:ext cx="6400800" cy="1752600"/>
-          </a:xfrm>
-        </p:spPr>
-        <p:txBody>
-          <a:bodyPr/>
-          <a:lstStyle>
-            <a:lvl1pPr marL="0" indent="0" algn="ctr">
-              <a:buNone/>
-              <a:defRPr>
-                <a:solidFill>
-                  <a:schemeClr val="tx1">
-                    <a:tint val="75000"/>
-                  </a:schemeClr>
-                </a:solidFill>
-              </a:defRPr>
-            </a:lvl1pPr>
-            <a:lvl2pPr marL="457200" indent="0" algn="ctr">
-              <a:buNone/>
-              <a:defRPr>
-                <a:solidFill>
-                  <a:schemeClr val="tx1">
-                    <a:tint val="75000"/>
-                  </a:schemeClr>
-                </a:solidFill>
-              </a:defRPr>
-            </a:lvl2pPr>
-            <a:lvl3pPr marL="914400" indent="0" algn="ctr">
-              <a:buNone/>
-              <a:defRPr>
-                <a:solidFill>
-                  <a:schemeClr val="tx1">
-                    <a:tint val="75000"/>
-                  </a:schemeClr>
-                </a:solidFill>
-              </a:defRPr>
-            </a:lvl3pPr>
-            <a:lvl4pPr marL="1371600" indent="0" algn="ctr">
-              <a:buNone/>
-              <a:defRPr>
-                <a:solidFill>
-                  <a:schemeClr val="tx1">
-                    <a:tint val="75000"/>
-                  </a:schemeClr>
-                </a:solidFill>
-              </a:defRPr>
-            </a:lvl4pPr>
-            <a:lvl5pPr marL="1828800" indent="0" algn="ctr">
-              <a:buNone/>
-              <a:defRPr>
-                <a:solidFill>
-                  <a:schemeClr val="tx1">
-                    <a:tint val="75000"/>
-                  </a:schemeClr>
-                </a:solidFill>
-              </a:defRPr>
-            </a:lvl5pPr>
-            <a:lvl6pPr marL="2286000" indent="0" algn="ctr">
-              <a:buNone/>
-              <a:defRPr>
-                <a:solidFill>
-                  <a:schemeClr val="tx1">
-                    <a:tint val="75000"/>
-                  </a:schemeClr>
-                </a:solidFill>
-              </a:defRPr>
-            </a:lvl6pPr>
-            <a:lvl7pPr marL="2743200" indent="0" algn="ctr">
-              <a:buNone/>
-              <a:defRPr>
-                <a:solidFill>
-                  <a:schemeClr val="tx1">
-                    <a:tint val="75000"/>
-                  </a:schemeClr>
-                </a:solidFill>
-              </a:defRPr>
-            </a:lvl7pPr>
-            <a:lvl8pPr marL="3200400" indent="0" algn="ctr">
-              <a:buNone/>
-              <a:defRPr>
-                <a:solidFill>
-                  <a:schemeClr val="tx1">
-                    <a:tint val="75000"/>
-                  </a:schemeClr>
-                </a:solidFill>
-              </a:defRPr>
-            </a:lvl8pPr>
-            <a:lvl9pPr marL="3657600" indent="0" algn="ctr">
-              <a:buNone/>
-              <a:defRPr>
-                <a:solidFill>
-                  <a:schemeClr val="tx1">
-                    <a:tint val="75000"/>
-                  </a:schemeClr>
-                </a:solidFill>
-              </a:defRPr>
-            </a:lvl9pPr>
-          </a:lstStyle>
-          <a:p>
-            <a:r>
-              <a:rPr lang="en-US" smtClean="0"/>
-              <a:t>Click to edit Master subtitle style</a:t>
-            </a:r>
-            <a:endParaRPr lang="en-US"/>
-          </a:p>
-        </p:txBody>
-      </p:sp>
-      <p:sp>
-        <p:nvSpPr>
-          <p:cNvPr id="4" name="Date Placeholder 3"/>
-          <p:cNvSpPr>
-            <a:spLocks noGrp="1"/>
-          </p:cNvSpPr>
-          <p:nvPr>
-            <p:ph type="dt" sz="half" idx="10"/>
-          </p:nvPr>
-        </p:nvSpPr>
-        <p:spPr/>
-        <p:txBody>
-          <a:bodyPr/>
-          <a:lstStyle/>
-          <a:p>
-            <a:fld id="{F8166F1F-CE9B-4651-A6AA-CD717754106B}" type="datetimeFigureOut">
-              <a:rPr lang="en-US" smtClean="0"/>
-              <a:t>7/1/2019</a:t>
-            </a:fld>
-            <a:endParaRPr lang="en-US"/>
-          </a:p>
-        </p:txBody>
-      </p:sp>
-      <p:sp>
-        <p:nvSpPr>
-          <p:cNvPr id="5" name="Slide Number Placeholder 5"/>
-          <p:cNvSpPr>
-            <a:spLocks noGrp="1"/>
-          </p:cNvSpPr>
-          <p:nvPr>
-            <p:ph type="sldNum" sz="quarter" idx="12"/>
-          </p:nvPr>
-        </p:nvSpPr>
-        <p:spPr/>
-        <p:txBody>
-          <a:bodyPr/>
-          <a:lstStyle/>
-          <a:p>
-            <a:fld id="{B1393E5F-521B-4CAD-9D3A-AE923D912DCE}" type="slidenum">
-              <a:rPr lang="en-US" smtClean="0"/>
-              <a:t>‹#›</a:t>
-            </a:fld>
-            <a:endParaRPr lang="en-US"/>
+          <a:bodyPr wrap="square" lIns="68580" tIns="34290" rIns="68580" bIns="34290">
+            <a:spAutoFit/>
+          </a:bodyPr>
+          <a:lstStyle/>
+          <a:p>
+            <a:pPr algn="ctr"/>
+            <a:r>
+              <a:rPr lang="en-US" sz="4000" b="1" dirty="0"/>
+              <a:t>Programming </a:t>
+            </a:r>
+            <a:r>
+              <a:rPr lang="en-US" sz="4000" b="1" dirty="0" smtClean="0"/>
+              <a:t>4</a:t>
+            </a:r>
+            <a:endParaRPr lang="en-US" sz="2500" b="1" dirty="0"/>
+          </a:p>
+          <a:p>
+            <a:pPr algn="ctr"/>
+            <a:r>
+              <a:rPr lang="en-US" sz="4000" b="1" dirty="0" smtClean="0"/>
+              <a:t>10</a:t>
+            </a:r>
+            <a:r>
+              <a:rPr lang="en-US" sz="4000" b="1" dirty="0" smtClean="0"/>
+              <a:t>.1 Inheritance Approach and Avoid</a:t>
+            </a:r>
+            <a:endParaRPr lang="en-US" sz="4000" b="1" dirty="0" smtClean="0"/>
+          </a:p>
+          <a:p>
+            <a:pPr algn="ctr"/>
+            <a:endParaRPr lang="en-US" sz="2500" b="1" dirty="0"/>
+          </a:p>
+          <a:p>
+            <a:pPr algn="ctr"/>
+            <a:r>
+              <a:rPr lang="en-US" sz="4000" b="1" dirty="0"/>
+              <a:t>Semester 2</a:t>
+            </a:r>
+            <a:r>
+              <a:rPr lang="en-US" sz="4000" b="1" dirty="0" smtClean="0"/>
+              <a:t>, </a:t>
+            </a:r>
+            <a:r>
+              <a:rPr lang="en-US" sz="4000" b="1" dirty="0"/>
+              <a:t>2019</a:t>
+            </a:r>
           </a:p>
         </p:txBody>
       </p:sp>
     </p:spTree>
+    <p:extLst>
+      <p:ext uri="{BB962C8B-B14F-4D97-AF65-F5344CB8AC3E}">
+        <p14:creationId xmlns:p14="http://schemas.microsoft.com/office/powerpoint/2010/main" val="20356590"/>
+      </p:ext>
+    </p:extLst>
   </p:cSld>
   <p:clrMapOvr>
     <a:masterClrMapping/>
   </p:clrMapOvr>
+  <p:timing>
+    <p:tnLst>
+      <p:par>
+        <p:cTn id="1" dur="indefinite" restart="never" nodeType="tmRoot"/>
+      </p:par>
+    </p:tnLst>
+  </p:timing>
+</p:sld>
+</file>
+
+<file path=ppt/slides/slide2.xml><?xml version="1.0" encoding="utf-8"?>
+<p:sld xmlns:a="http://schemas.openxmlformats.org/drawingml/2006/main" xmlns:r="http://schemas.openxmlformats.org/officeDocument/2006/relationships" xmlns:p="http://schemas.openxmlformats.org/presentationml/2006/main">
+  <p:cSld>
+    <p:bg>
+      <p:bgPr>
+        <a:solidFill>
+          <a:schemeClr val="accent5">
+            <a:lumMod val="60000"/>
+            <a:lumOff val="40000"/>
+          </a:schemeClr>
+        </a:solidFill>
+        <a:effectLst/>
+      </p:bgPr>
+    </p:bg>
+    <p:spTree>
+      <p:nvGrpSpPr>
+        <p:cNvPr id="1" name=""/>
+        <p:cNvGrpSpPr/>
+        <p:nvPr/>
+      </p:nvGrpSpPr>
+      <p:grpSpPr>
+        <a:xfrm>
+          <a:off x="0" y="0"/>
+          <a:ext cx="0" cy="0"/>
+          <a:chOff x="0" y="0"/>
+          <a:chExt cx="0" cy="0"/>
+        </a:xfrm>
+      </p:grpSpPr>
+      <p:sp>
+        <p:nvSpPr>
+          <p:cNvPr id="3" name="Rectangle 2"/>
+          <p:cNvSpPr/>
+          <p:nvPr/>
+        </p:nvSpPr>
+        <p:spPr>
+          <a:xfrm>
+            <a:off x="0" y="0"/>
+            <a:ext cx="9144000" cy="6632585"/>
+          </a:xfrm>
+          <a:prstGeom prst="rect">
+            <a:avLst/>
+          </a:prstGeom>
+        </p:spPr>
+        <p:txBody>
+          <a:bodyPr wrap="square">
+            <a:spAutoFit/>
+          </a:bodyPr>
+          <a:lstStyle/>
+          <a:p>
+            <a:pPr algn="ctr"/>
+            <a:endParaRPr lang="en-US" sz="4000" b="1" dirty="0"/>
+          </a:p>
+          <a:p>
+            <a:pPr lvl="1"/>
+            <a:r>
+              <a:rPr lang="en-NZ" sz="3500" b="1" dirty="0" smtClean="0"/>
+              <a:t>Inheritance in OO - review</a:t>
+            </a:r>
+            <a:endParaRPr lang="en-US" sz="3500" b="1" dirty="0" smtClean="0"/>
+          </a:p>
+          <a:p>
+            <a:pPr marL="1657350" lvl="2" indent="-742950">
+              <a:buFont typeface="Arial" panose="020B0604020202020204" pitchFamily="34" charset="0"/>
+              <a:buChar char="•"/>
+            </a:pPr>
+            <a:endParaRPr lang="en-US" sz="2500" dirty="0" smtClean="0"/>
+          </a:p>
+          <a:p>
+            <a:pPr marL="1657350" lvl="2" indent="-742950">
+              <a:buFont typeface="Arial" panose="020B0604020202020204" pitchFamily="34" charset="0"/>
+              <a:buChar char="•"/>
+            </a:pPr>
+            <a:r>
+              <a:rPr lang="en-NZ" sz="2500" dirty="0"/>
+              <a:t>A group of classes are related in that they have a common core of shared functionality and/or </a:t>
+            </a:r>
+            <a:r>
+              <a:rPr lang="en-NZ" sz="2500" dirty="0" smtClean="0"/>
+              <a:t>data</a:t>
+            </a:r>
+            <a:endParaRPr lang="en-NZ" sz="2500" dirty="0"/>
+          </a:p>
+          <a:p>
+            <a:pPr marL="1657350" lvl="2" indent="-742950">
+              <a:buFont typeface="Arial" panose="020B0604020202020204" pitchFamily="34" charset="0"/>
+              <a:buChar char="•"/>
+            </a:pPr>
+            <a:r>
+              <a:rPr lang="en-NZ" sz="2500" dirty="0"/>
+              <a:t>Child classes extend parent (base classes) by </a:t>
+            </a:r>
+            <a:r>
+              <a:rPr lang="en-NZ" sz="2500" dirty="0" smtClean="0"/>
+              <a:t>descent</a:t>
+            </a:r>
+            <a:endParaRPr lang="en-NZ" sz="2500" dirty="0"/>
+          </a:p>
+          <a:p>
+            <a:pPr marL="1657350" lvl="2" indent="-742950">
+              <a:buFont typeface="Arial" panose="020B0604020202020204" pitchFamily="34" charset="0"/>
+              <a:buChar char="•"/>
+            </a:pPr>
+            <a:r>
+              <a:rPr lang="en-NZ" sz="2500" dirty="0"/>
+              <a:t>Child classes contain all public or protected data and </a:t>
+            </a:r>
+            <a:r>
+              <a:rPr lang="en-NZ" sz="2500" dirty="0" smtClean="0"/>
+              <a:t>	methods </a:t>
+            </a:r>
+            <a:r>
+              <a:rPr lang="en-NZ" sz="2500" dirty="0"/>
+              <a:t>of their </a:t>
+            </a:r>
+            <a:r>
+              <a:rPr lang="en-NZ" sz="2500" dirty="0" smtClean="0"/>
+              <a:t>ancestors</a:t>
+            </a:r>
+            <a:endParaRPr lang="en-NZ" sz="2500" dirty="0"/>
+          </a:p>
+          <a:p>
+            <a:pPr marL="1657350" lvl="2" indent="-742950">
+              <a:buFont typeface="Arial" panose="020B0604020202020204" pitchFamily="34" charset="0"/>
+              <a:buChar char="•"/>
+            </a:pPr>
+            <a:r>
+              <a:rPr lang="en-NZ" sz="2500" dirty="0"/>
+              <a:t>Inheritance promotes code reuse and reduces code duplication.</a:t>
+            </a:r>
+          </a:p>
+          <a:p>
+            <a:pPr marL="1657350" lvl="2" indent="-742950">
+              <a:buFont typeface="Arial" panose="020B0604020202020204" pitchFamily="34" charset="0"/>
+              <a:buChar char="•"/>
+            </a:pPr>
+            <a:r>
+              <a:rPr lang="en-NZ" sz="2500" dirty="0"/>
+              <a:t>Child classes contain additional data, additional functionality or polymorphic </a:t>
+            </a:r>
+            <a:r>
+              <a:rPr lang="en-NZ" sz="2500" dirty="0" smtClean="0"/>
+              <a:t>implementations</a:t>
+            </a:r>
+            <a:endParaRPr lang="en-NZ" sz="2500" dirty="0"/>
+          </a:p>
+          <a:p>
+            <a:pPr marL="1657350" lvl="2" indent="-742950">
+              <a:buFont typeface="Arial" panose="020B0604020202020204" pitchFamily="34" charset="0"/>
+              <a:buChar char="•"/>
+            </a:pPr>
+            <a:r>
+              <a:rPr lang="en-NZ" sz="2500" dirty="0"/>
+              <a:t>The parent-child relationship must be an “is-a” relationship, not a “has-a” </a:t>
+            </a:r>
+            <a:r>
+              <a:rPr lang="en-NZ" sz="2500" dirty="0" smtClean="0"/>
+              <a:t>relationship</a:t>
+            </a:r>
+            <a:endParaRPr lang="en-US" sz="2500" dirty="0" smtClean="0"/>
+          </a:p>
+          <a:p>
+            <a:pPr marL="1657350" lvl="2" indent="-742950">
+              <a:buFont typeface="Arial" panose="020B0604020202020204" pitchFamily="34" charset="0"/>
+              <a:buChar char="•"/>
+            </a:pPr>
+            <a:endParaRPr lang="en-US" sz="2500" dirty="0" smtClean="0"/>
+          </a:p>
+          <a:p>
+            <a:pPr marL="1657350" lvl="2" indent="-742950">
+              <a:buFont typeface="Arial" panose="020B0604020202020204" pitchFamily="34" charset="0"/>
+              <a:buChar char="•"/>
+            </a:pPr>
+            <a:endParaRPr lang="en-US" sz="2500" dirty="0" smtClean="0"/>
+          </a:p>
+        </p:txBody>
+      </p:sp>
+    </p:spTree>
+    <p:extLst>
+      <p:ext uri="{BB962C8B-B14F-4D97-AF65-F5344CB8AC3E}">
+        <p14:creationId xmlns:p14="http://schemas.microsoft.com/office/powerpoint/2010/main" val="1278459137"/>
+      </p:ext>
+    </p:extLst>
+  </p:cSld>
+  <p:clrMapOvr>
+    <a:masterClrMapping/>
+  </p:clrMapOvr>
+  <p:timing>
+    <p:tnLst>
+      <p:par>
+        <p:cTn id="1" dur="indefinite" restart="never" nodeType="tmRoot"/>
+      </p:par>
+    </p:tnLst>
+  </p:timing>
+</p:sld>
+</file>
+
+<file path=ppt/slides/slide3.xml><?xml version="1.0" encoding="utf-8"?>
+<p:sld xmlns:a="http://schemas.openxmlformats.org/drawingml/2006/main" xmlns:r="http://schemas.openxmlformats.org/officeDocument/2006/relationships" xmlns:p="http://schemas.openxmlformats.org/presentationml/2006/main">
+  <p:cSld>
+    <p:bg>
+      <p:bgPr>
+        <a:solidFill>
+          <a:schemeClr val="accent5">
+            <a:lumMod val="60000"/>
+            <a:lumOff val="40000"/>
+          </a:schemeClr>
+        </a:solidFill>
+        <a:effectLst/>
+      </p:bgPr>
+    </p:bg>
+    <p:spTree>
+      <p:nvGrpSpPr>
+        <p:cNvPr id="1" name=""/>
+        <p:cNvGrpSpPr/>
+        <p:nvPr/>
+      </p:nvGrpSpPr>
+      <p:grpSpPr>
+        <a:xfrm>
+          <a:off x="0" y="0"/>
+          <a:ext cx="0" cy="0"/>
+          <a:chOff x="0" y="0"/>
+          <a:chExt cx="0" cy="0"/>
+        </a:xfrm>
+      </p:grpSpPr>
+      <p:sp>
+        <p:nvSpPr>
+          <p:cNvPr id="3" name="Rectangle 2"/>
+          <p:cNvSpPr/>
+          <p:nvPr/>
+        </p:nvSpPr>
+        <p:spPr>
+          <a:xfrm>
+            <a:off x="0" y="0"/>
+            <a:ext cx="9144000" cy="2785378"/>
+          </a:xfrm>
+          <a:prstGeom prst="rect">
+            <a:avLst/>
+          </a:prstGeom>
+        </p:spPr>
+        <p:txBody>
+          <a:bodyPr wrap="square">
+            <a:spAutoFit/>
+          </a:bodyPr>
+          <a:lstStyle/>
+          <a:p>
+            <a:pPr algn="ctr"/>
+            <a:endParaRPr lang="en-US" sz="4000" b="1" dirty="0"/>
+          </a:p>
+          <a:p>
+            <a:pPr lvl="1"/>
+            <a:r>
+              <a:rPr lang="en-NZ" sz="3500" b="1" dirty="0" smtClean="0"/>
+              <a:t>Inheritance in OO - review</a:t>
+            </a:r>
+            <a:endParaRPr lang="en-US" sz="3500" b="1" dirty="0" smtClean="0"/>
+          </a:p>
+          <a:p>
+            <a:pPr marL="1657350" lvl="2" indent="-742950">
+              <a:buFont typeface="Arial" panose="020B0604020202020204" pitchFamily="34" charset="0"/>
+              <a:buChar char="•"/>
+            </a:pPr>
+            <a:endParaRPr lang="en-US" sz="2500" dirty="0" smtClean="0"/>
+          </a:p>
+          <a:p>
+            <a:pPr marL="1657350" lvl="2" indent="-742950">
+              <a:buFont typeface="Arial" panose="020B0604020202020204" pitchFamily="34" charset="0"/>
+              <a:buChar char="•"/>
+            </a:pPr>
+            <a:r>
+              <a:rPr lang="en-NZ" sz="2500" dirty="0" smtClean="0"/>
+              <a:t>Inheritance for extension</a:t>
+            </a:r>
+            <a:endParaRPr lang="en-US" sz="2500" dirty="0" smtClean="0"/>
+          </a:p>
+          <a:p>
+            <a:pPr marL="1657350" lvl="2" indent="-742950">
+              <a:buFont typeface="Arial" panose="020B0604020202020204" pitchFamily="34" charset="0"/>
+              <a:buChar char="•"/>
+            </a:pPr>
+            <a:endParaRPr lang="en-US" sz="2500" dirty="0" smtClean="0"/>
+          </a:p>
+          <a:p>
+            <a:pPr marL="1657350" lvl="2" indent="-742950">
+              <a:buFont typeface="Arial" panose="020B0604020202020204" pitchFamily="34" charset="0"/>
+              <a:buChar char="•"/>
+            </a:pPr>
+            <a:endParaRPr lang="en-US" sz="2500" dirty="0" smtClean="0"/>
+          </a:p>
+        </p:txBody>
+      </p:sp>
+      <p:grpSp>
+        <p:nvGrpSpPr>
+          <p:cNvPr id="2" name="Group 1"/>
+          <p:cNvGrpSpPr/>
+          <p:nvPr/>
+        </p:nvGrpSpPr>
+        <p:grpSpPr>
+          <a:xfrm>
+            <a:off x="2879812" y="2438400"/>
+            <a:ext cx="3384376" cy="3312368"/>
+            <a:chOff x="2895600" y="2438400"/>
+            <a:chExt cx="3384376" cy="3312368"/>
+          </a:xfrm>
+        </p:grpSpPr>
+        <p:sp>
+          <p:nvSpPr>
+            <p:cNvPr id="4" name="Rectangle 3"/>
+            <p:cNvSpPr/>
+            <p:nvPr/>
+          </p:nvSpPr>
+          <p:spPr>
+            <a:xfrm>
+              <a:off x="2895600" y="2438400"/>
+              <a:ext cx="3384376" cy="1296144"/>
+            </a:xfrm>
+            <a:prstGeom prst="rect">
+              <a:avLst/>
+            </a:prstGeom>
+          </p:spPr>
+          <p:style>
+            <a:lnRef idx="2">
+              <a:schemeClr val="accent1">
+                <a:shade val="50000"/>
+              </a:schemeClr>
+            </a:lnRef>
+            <a:fillRef idx="1">
+              <a:schemeClr val="accent1"/>
+            </a:fillRef>
+            <a:effectRef idx="0">
+              <a:schemeClr val="accent1"/>
+            </a:effectRef>
+            <a:fontRef idx="minor">
+              <a:schemeClr val="lt1"/>
+            </a:fontRef>
+          </p:style>
+          <p:txBody>
+            <a:bodyPr rtlCol="0" anchor="ctr"/>
+            <a:lstStyle/>
+            <a:p>
+              <a:pPr algn="ctr"/>
+              <a:r>
+                <a:rPr lang="en-NZ" dirty="0" smtClean="0"/>
+                <a:t>Base Class: Common Core</a:t>
+              </a:r>
+              <a:endParaRPr lang="en-NZ" dirty="0"/>
+            </a:p>
+          </p:txBody>
+        </p:sp>
+        <p:sp>
+          <p:nvSpPr>
+            <p:cNvPr id="5" name="Rectangle 4"/>
+            <p:cNvSpPr/>
+            <p:nvPr/>
+          </p:nvSpPr>
+          <p:spPr>
+            <a:xfrm>
+              <a:off x="2895600" y="4454624"/>
+              <a:ext cx="3384376" cy="1296144"/>
+            </a:xfrm>
+            <a:prstGeom prst="rect">
+              <a:avLst/>
+            </a:prstGeom>
+          </p:spPr>
+          <p:style>
+            <a:lnRef idx="2">
+              <a:schemeClr val="accent1">
+                <a:shade val="50000"/>
+              </a:schemeClr>
+            </a:lnRef>
+            <a:fillRef idx="1">
+              <a:schemeClr val="accent1"/>
+            </a:fillRef>
+            <a:effectRef idx="0">
+              <a:schemeClr val="accent1"/>
+            </a:effectRef>
+            <a:fontRef idx="minor">
+              <a:schemeClr val="lt1"/>
+            </a:fontRef>
+          </p:style>
+          <p:txBody>
+            <a:bodyPr rtlCol="0" anchor="ctr"/>
+            <a:lstStyle/>
+            <a:p>
+              <a:pPr algn="ctr"/>
+              <a:r>
+                <a:rPr lang="en-NZ" dirty="0" smtClean="0"/>
+                <a:t>Child Class: + Specialised</a:t>
+              </a:r>
+              <a:endParaRPr lang="en-NZ" dirty="0"/>
+            </a:p>
+          </p:txBody>
+        </p:sp>
+        <p:cxnSp>
+          <p:nvCxnSpPr>
+            <p:cNvPr id="6" name="Straight Arrow Connector 5"/>
+            <p:cNvCxnSpPr>
+              <a:stCxn id="4" idx="2"/>
+              <a:endCxn id="5" idx="0"/>
+            </p:cNvCxnSpPr>
+            <p:nvPr/>
+          </p:nvCxnSpPr>
+          <p:spPr>
+            <a:xfrm>
+              <a:off x="4587788" y="3734544"/>
+              <a:ext cx="0" cy="720080"/>
+            </a:xfrm>
+            <a:prstGeom prst="straightConnector1">
+              <a:avLst/>
+            </a:prstGeom>
+            <a:ln>
+              <a:tailEnd type="arrow"/>
+            </a:ln>
+          </p:spPr>
+          <p:style>
+            <a:lnRef idx="1">
+              <a:schemeClr val="accent1"/>
+            </a:lnRef>
+            <a:fillRef idx="0">
+              <a:schemeClr val="accent1"/>
+            </a:fillRef>
+            <a:effectRef idx="0">
+              <a:schemeClr val="accent1"/>
+            </a:effectRef>
+            <a:fontRef idx="minor">
+              <a:schemeClr val="tx1"/>
+            </a:fontRef>
+          </p:style>
+        </p:cxnSp>
+      </p:grpSp>
+    </p:spTree>
+    <p:extLst>
+      <p:ext uri="{BB962C8B-B14F-4D97-AF65-F5344CB8AC3E}">
+        <p14:creationId xmlns:p14="http://schemas.microsoft.com/office/powerpoint/2010/main" val="1917711665"/>
+      </p:ext>
+    </p:extLst>
+  </p:cSld>
+  <p:clrMapOvr>
+    <a:masterClrMapping/>
+  </p:clrMapOvr>
+  <p:timing>
+    <p:tnLst>
+      <p:par>
+        <p:cTn id="1" dur="indefinite" restart="never" nodeType="tmRoot"/>
+      </p:par>
+    </p:tnLst>
+  </p:timing>
+</p:sld>
+</file>
+
+<file path=ppt/slides/slide4.xml><?xml version="1.0" encoding="utf-8"?>
+<p:sld xmlns:a="http://schemas.openxmlformats.org/drawingml/2006/main" xmlns:r="http://schemas.openxmlformats.org/officeDocument/2006/relationships" xmlns:p="http://schemas.openxmlformats.org/presentationml/2006/main">
+  <p:cSld>
+    <p:bg>
+      <p:bgPr>
+        <a:solidFill>
+          <a:schemeClr val="accent5">
+            <a:lumMod val="60000"/>
+            <a:lumOff val="40000"/>
+          </a:schemeClr>
+        </a:solidFill>
+        <a:effectLst/>
+      </p:bgPr>
+    </p:bg>
+    <p:spTree>
+      <p:nvGrpSpPr>
+        <p:cNvPr id="1" name=""/>
+        <p:cNvGrpSpPr/>
+        <p:nvPr/>
+      </p:nvGrpSpPr>
+      <p:grpSpPr>
+        <a:xfrm>
+          <a:off x="0" y="0"/>
+          <a:ext cx="0" cy="0"/>
+          <a:chOff x="0" y="0"/>
+          <a:chExt cx="0" cy="0"/>
+        </a:xfrm>
+      </p:grpSpPr>
+      <p:sp>
+        <p:nvSpPr>
+          <p:cNvPr id="3" name="Rectangle 2"/>
+          <p:cNvSpPr/>
+          <p:nvPr/>
+        </p:nvSpPr>
+        <p:spPr>
+          <a:xfrm>
+            <a:off x="0" y="0"/>
+            <a:ext cx="9144000" cy="2785378"/>
+          </a:xfrm>
+          <a:prstGeom prst="rect">
+            <a:avLst/>
+          </a:prstGeom>
+        </p:spPr>
+        <p:txBody>
+          <a:bodyPr wrap="square">
+            <a:spAutoFit/>
+          </a:bodyPr>
+          <a:lstStyle/>
+          <a:p>
+            <a:pPr algn="ctr"/>
+            <a:endParaRPr lang="en-US" sz="4000" b="1" dirty="0"/>
+          </a:p>
+          <a:p>
+            <a:pPr lvl="1"/>
+            <a:r>
+              <a:rPr lang="en-NZ" sz="3500" b="1" dirty="0" smtClean="0"/>
+              <a:t>Inheritance in OO - review</a:t>
+            </a:r>
+            <a:endParaRPr lang="en-US" sz="3500" b="1" dirty="0" smtClean="0"/>
+          </a:p>
+          <a:p>
+            <a:pPr marL="1657350" lvl="2" indent="-742950">
+              <a:buFont typeface="Arial" panose="020B0604020202020204" pitchFamily="34" charset="0"/>
+              <a:buChar char="•"/>
+            </a:pPr>
+            <a:endParaRPr lang="en-US" sz="2500" dirty="0" smtClean="0"/>
+          </a:p>
+          <a:p>
+            <a:pPr marL="1657350" lvl="2" indent="-742950">
+              <a:buFont typeface="Arial" panose="020B0604020202020204" pitchFamily="34" charset="0"/>
+              <a:buChar char="•"/>
+            </a:pPr>
+            <a:r>
+              <a:rPr lang="en-NZ" sz="2500" dirty="0" smtClean="0"/>
+              <a:t>Inheritance for polymorphism</a:t>
+            </a:r>
+            <a:endParaRPr lang="en-US" sz="2500" dirty="0" smtClean="0"/>
+          </a:p>
+          <a:p>
+            <a:pPr marL="1657350" lvl="2" indent="-742950">
+              <a:buFont typeface="Arial" panose="020B0604020202020204" pitchFamily="34" charset="0"/>
+              <a:buChar char="•"/>
+            </a:pPr>
+            <a:endParaRPr lang="en-US" sz="2500" dirty="0" smtClean="0"/>
+          </a:p>
+          <a:p>
+            <a:pPr marL="1657350" lvl="2" indent="-742950">
+              <a:buFont typeface="Arial" panose="020B0604020202020204" pitchFamily="34" charset="0"/>
+              <a:buChar char="•"/>
+            </a:pPr>
+            <a:endParaRPr lang="en-US" sz="2500" dirty="0" smtClean="0"/>
+          </a:p>
+        </p:txBody>
+      </p:sp>
+      <p:grpSp>
+        <p:nvGrpSpPr>
+          <p:cNvPr id="2" name="Group 1"/>
+          <p:cNvGrpSpPr/>
+          <p:nvPr/>
+        </p:nvGrpSpPr>
+        <p:grpSpPr>
+          <a:xfrm>
+            <a:off x="773578" y="2438400"/>
+            <a:ext cx="7596844" cy="3528392"/>
+            <a:chOff x="683568" y="2852936"/>
+            <a:chExt cx="7596844" cy="3528392"/>
+          </a:xfrm>
+        </p:grpSpPr>
+        <p:sp>
+          <p:nvSpPr>
+            <p:cNvPr id="7" name="Rectangle 6"/>
+            <p:cNvSpPr/>
+            <p:nvPr/>
+          </p:nvSpPr>
+          <p:spPr>
+            <a:xfrm>
+              <a:off x="2843808" y="2852936"/>
+              <a:ext cx="3384376" cy="1296144"/>
+            </a:xfrm>
+            <a:prstGeom prst="rect">
+              <a:avLst/>
+            </a:prstGeom>
+          </p:spPr>
+          <p:style>
+            <a:lnRef idx="2">
+              <a:schemeClr val="accent1">
+                <a:shade val="50000"/>
+              </a:schemeClr>
+            </a:lnRef>
+            <a:fillRef idx="1">
+              <a:schemeClr val="accent1"/>
+            </a:fillRef>
+            <a:effectRef idx="0">
+              <a:schemeClr val="accent1"/>
+            </a:effectRef>
+            <a:fontRef idx="minor">
+              <a:schemeClr val="lt1"/>
+            </a:fontRef>
+          </p:style>
+          <p:txBody>
+            <a:bodyPr rtlCol="0" anchor="ctr"/>
+            <a:lstStyle/>
+            <a:p>
+              <a:pPr algn="ctr"/>
+              <a:r>
+                <a:rPr lang="en-NZ" dirty="0" smtClean="0"/>
+                <a:t>Base Class – Common Core</a:t>
+              </a:r>
+            </a:p>
+            <a:p>
+              <a:pPr algn="ctr"/>
+              <a:r>
+                <a:rPr lang="en-NZ" dirty="0" smtClean="0"/>
+                <a:t>Including </a:t>
+              </a:r>
+              <a:r>
+                <a:rPr lang="en-NZ" dirty="0" err="1" smtClean="0"/>
+                <a:t>ImportantJob</a:t>
+              </a:r>
+              <a:r>
+                <a:rPr lang="en-NZ" dirty="0" smtClean="0"/>
+                <a:t>()</a:t>
+              </a:r>
+              <a:endParaRPr lang="en-NZ" dirty="0"/>
+            </a:p>
+          </p:txBody>
+        </p:sp>
+        <p:sp>
+          <p:nvSpPr>
+            <p:cNvPr id="8" name="Rectangle 7"/>
+            <p:cNvSpPr/>
+            <p:nvPr/>
+          </p:nvSpPr>
+          <p:spPr>
+            <a:xfrm>
+              <a:off x="683568" y="5085184"/>
+              <a:ext cx="3384376" cy="1296144"/>
+            </a:xfrm>
+            <a:prstGeom prst="rect">
+              <a:avLst/>
+            </a:prstGeom>
+          </p:spPr>
+          <p:style>
+            <a:lnRef idx="2">
+              <a:schemeClr val="accent1">
+                <a:shade val="50000"/>
+              </a:schemeClr>
+            </a:lnRef>
+            <a:fillRef idx="1">
+              <a:schemeClr val="accent1"/>
+            </a:fillRef>
+            <a:effectRef idx="0">
+              <a:schemeClr val="accent1"/>
+            </a:effectRef>
+            <a:fontRef idx="minor">
+              <a:schemeClr val="lt1"/>
+            </a:fontRef>
+          </p:style>
+          <p:txBody>
+            <a:bodyPr rtlCol="0" anchor="ctr"/>
+            <a:lstStyle/>
+            <a:p>
+              <a:pPr algn="ctr"/>
+              <a:r>
+                <a:rPr lang="en-NZ" dirty="0" smtClean="0"/>
+                <a:t>Child Class1</a:t>
+              </a:r>
+            </a:p>
+            <a:p>
+              <a:pPr algn="ctr"/>
+              <a:r>
+                <a:rPr lang="en-NZ" dirty="0" smtClean="0"/>
+                <a:t>Implements </a:t>
+              </a:r>
+              <a:r>
+                <a:rPr lang="en-NZ" dirty="0" err="1" smtClean="0"/>
+                <a:t>ImportantJob</a:t>
+              </a:r>
+              <a:r>
+                <a:rPr lang="en-NZ" dirty="0" smtClean="0"/>
+                <a:t>() </a:t>
+              </a:r>
+              <a:r>
+                <a:rPr lang="en-NZ" dirty="0" smtClean="0"/>
+                <a:t>with algorithm 1</a:t>
+              </a:r>
+              <a:endParaRPr lang="en-NZ" dirty="0"/>
+            </a:p>
+          </p:txBody>
+        </p:sp>
+        <p:cxnSp>
+          <p:nvCxnSpPr>
+            <p:cNvPr id="9" name="Straight Arrow Connector 8"/>
+            <p:cNvCxnSpPr>
+              <a:stCxn id="7" idx="2"/>
+              <a:endCxn id="8" idx="0"/>
+            </p:cNvCxnSpPr>
+            <p:nvPr/>
+          </p:nvCxnSpPr>
+          <p:spPr>
+            <a:xfrm flipH="1">
+              <a:off x="2375756" y="4149080"/>
+              <a:ext cx="2160240" cy="936104"/>
+            </a:xfrm>
+            <a:prstGeom prst="straightConnector1">
+              <a:avLst/>
+            </a:prstGeom>
+            <a:ln w="57150">
+              <a:solidFill>
+                <a:schemeClr val="tx1"/>
+              </a:solidFill>
+              <a:tailEnd type="arrow"/>
+            </a:ln>
+          </p:spPr>
+          <p:style>
+            <a:lnRef idx="1">
+              <a:schemeClr val="accent1"/>
+            </a:lnRef>
+            <a:fillRef idx="0">
+              <a:schemeClr val="accent1"/>
+            </a:fillRef>
+            <a:effectRef idx="0">
+              <a:schemeClr val="accent1"/>
+            </a:effectRef>
+            <a:fontRef idx="minor">
+              <a:schemeClr val="tx1"/>
+            </a:fontRef>
+          </p:style>
+        </p:cxnSp>
+        <p:sp>
+          <p:nvSpPr>
+            <p:cNvPr id="10" name="Rectangle 9"/>
+            <p:cNvSpPr/>
+            <p:nvPr/>
+          </p:nvSpPr>
+          <p:spPr>
+            <a:xfrm>
+              <a:off x="4896036" y="5085184"/>
+              <a:ext cx="3384376" cy="1296144"/>
+            </a:xfrm>
+            <a:prstGeom prst="rect">
+              <a:avLst/>
+            </a:prstGeom>
+          </p:spPr>
+          <p:style>
+            <a:lnRef idx="2">
+              <a:schemeClr val="accent1">
+                <a:shade val="50000"/>
+              </a:schemeClr>
+            </a:lnRef>
+            <a:fillRef idx="1">
+              <a:schemeClr val="accent1"/>
+            </a:fillRef>
+            <a:effectRef idx="0">
+              <a:schemeClr val="accent1"/>
+            </a:effectRef>
+            <a:fontRef idx="minor">
+              <a:schemeClr val="lt1"/>
+            </a:fontRef>
+          </p:style>
+          <p:txBody>
+            <a:bodyPr rtlCol="0" anchor="ctr"/>
+            <a:lstStyle/>
+            <a:p>
+              <a:pPr algn="ctr"/>
+              <a:r>
+                <a:rPr lang="en-NZ" dirty="0" smtClean="0"/>
+                <a:t>Child Class2</a:t>
+              </a:r>
+            </a:p>
+            <a:p>
+              <a:pPr algn="ctr"/>
+              <a:r>
+                <a:rPr lang="en-NZ" dirty="0" smtClean="0"/>
+                <a:t>Implements </a:t>
+              </a:r>
+              <a:r>
+                <a:rPr lang="en-NZ" dirty="0" err="1" smtClean="0"/>
+                <a:t>ImportantJob</a:t>
+              </a:r>
+              <a:r>
+                <a:rPr lang="en-NZ" dirty="0" smtClean="0"/>
+                <a:t>() </a:t>
+              </a:r>
+              <a:r>
+                <a:rPr lang="en-NZ" dirty="0" smtClean="0"/>
+                <a:t>with algorithm 2</a:t>
+              </a:r>
+              <a:endParaRPr lang="en-NZ" dirty="0"/>
+            </a:p>
+          </p:txBody>
+        </p:sp>
+        <p:cxnSp>
+          <p:nvCxnSpPr>
+            <p:cNvPr id="11" name="Straight Arrow Connector 10"/>
+            <p:cNvCxnSpPr>
+              <a:stCxn id="7" idx="2"/>
+              <a:endCxn id="10" idx="0"/>
+            </p:cNvCxnSpPr>
+            <p:nvPr/>
+          </p:nvCxnSpPr>
+          <p:spPr>
+            <a:xfrm>
+              <a:off x="4535996" y="4149080"/>
+              <a:ext cx="2052228" cy="936104"/>
+            </a:xfrm>
+            <a:prstGeom prst="straightConnector1">
+              <a:avLst/>
+            </a:prstGeom>
+            <a:ln w="57150">
+              <a:solidFill>
+                <a:schemeClr val="tx1"/>
+              </a:solidFill>
+              <a:tailEnd type="arrow"/>
+            </a:ln>
+          </p:spPr>
+          <p:style>
+            <a:lnRef idx="1">
+              <a:schemeClr val="accent1"/>
+            </a:lnRef>
+            <a:fillRef idx="0">
+              <a:schemeClr val="accent1"/>
+            </a:fillRef>
+            <a:effectRef idx="0">
+              <a:schemeClr val="accent1"/>
+            </a:effectRef>
+            <a:fontRef idx="minor">
+              <a:schemeClr val="tx1"/>
+            </a:fontRef>
+          </p:style>
+        </p:cxnSp>
+      </p:grpSp>
+    </p:spTree>
+    <p:extLst>
+      <p:ext uri="{BB962C8B-B14F-4D97-AF65-F5344CB8AC3E}">
+        <p14:creationId xmlns:p14="http://schemas.microsoft.com/office/powerpoint/2010/main" val="4094659714"/>
+      </p:ext>
+    </p:extLst>
+  </p:cSld>
+  <p:clrMapOvr>
+    <a:masterClrMapping/>
+  </p:clrMapOvr>
+  <p:timing>
+    <p:tnLst>
+      <p:par>
+        <p:cTn id="1" dur="indefinite" restart="never" nodeType="tmRoot"/>
+      </p:par>
+    </p:tnLst>
+  </p:timing>
+</p:sld>
+</file>
+
+<file path=ppt/slides/slide5.xml><?xml version="1.0" encoding="utf-8"?>
+<p:sld xmlns:a="http://schemas.openxmlformats.org/drawingml/2006/main" xmlns:r="http://schemas.openxmlformats.org/officeDocument/2006/relationships" xmlns:p="http://schemas.openxmlformats.org/presentationml/2006/main">
+  <p:cSld>
+    <p:bg>
+      <p:bgPr>
+        <a:solidFill>
+          <a:schemeClr val="accent5">
+            <a:lumMod val="60000"/>
+            <a:lumOff val="40000"/>
+          </a:schemeClr>
+        </a:solidFill>
+        <a:effectLst/>
+      </p:bgPr>
+    </p:bg>
+    <p:spTree>
+      <p:nvGrpSpPr>
+        <p:cNvPr id="1" name=""/>
+        <p:cNvGrpSpPr/>
+        <p:nvPr/>
+      </p:nvGrpSpPr>
+      <p:grpSpPr>
+        <a:xfrm>
+          <a:off x="0" y="0"/>
+          <a:ext cx="0" cy="0"/>
+          <a:chOff x="0" y="0"/>
+          <a:chExt cx="0" cy="0"/>
+        </a:xfrm>
+      </p:grpSpPr>
+      <p:sp>
+        <p:nvSpPr>
+          <p:cNvPr id="3" name="Rectangle 2"/>
+          <p:cNvSpPr/>
+          <p:nvPr/>
+        </p:nvSpPr>
+        <p:spPr>
+          <a:xfrm>
+            <a:off x="0" y="0"/>
+            <a:ext cx="9144000" cy="3554819"/>
+          </a:xfrm>
+          <a:prstGeom prst="rect">
+            <a:avLst/>
+          </a:prstGeom>
+        </p:spPr>
+        <p:txBody>
+          <a:bodyPr wrap="square">
+            <a:spAutoFit/>
+          </a:bodyPr>
+          <a:lstStyle/>
+          <a:p>
+            <a:pPr algn="ctr"/>
+            <a:endParaRPr lang="en-US" sz="4000" b="1" dirty="0"/>
+          </a:p>
+          <a:p>
+            <a:pPr lvl="1"/>
+            <a:r>
+              <a:rPr lang="en-NZ" sz="3500" b="1" dirty="0" smtClean="0"/>
+              <a:t>Dangers of inheritance</a:t>
+            </a:r>
+            <a:endParaRPr lang="en-US" sz="3500" b="1" dirty="0" smtClean="0"/>
+          </a:p>
+          <a:p>
+            <a:pPr marL="1657350" lvl="2" indent="-742950">
+              <a:buFont typeface="Arial" panose="020B0604020202020204" pitchFamily="34" charset="0"/>
+              <a:buChar char="•"/>
+            </a:pPr>
+            <a:endParaRPr lang="en-US" sz="2500" dirty="0" smtClean="0"/>
+          </a:p>
+          <a:p>
+            <a:pPr marL="1657350" lvl="2" indent="-742950">
+              <a:buFont typeface="Arial" panose="020B0604020202020204" pitchFamily="34" charset="0"/>
+              <a:buChar char="•"/>
+            </a:pPr>
+            <a:r>
+              <a:rPr lang="en-NZ" sz="2500" dirty="0"/>
+              <a:t>Cumbersome hierarchies – confusing to use</a:t>
+            </a:r>
+          </a:p>
+          <a:p>
+            <a:pPr marL="1657350" lvl="2" indent="-742950">
+              <a:buFont typeface="Arial" panose="020B0604020202020204" pitchFamily="34" charset="0"/>
+              <a:buChar char="•"/>
+            </a:pPr>
+            <a:r>
+              <a:rPr lang="en-NZ" sz="2500" dirty="0"/>
+              <a:t>Single hierarchical structure not a good match for information architecture.</a:t>
+            </a:r>
+          </a:p>
+          <a:p>
+            <a:pPr marL="1657350" lvl="2" indent="-742950">
+              <a:buFont typeface="Arial" panose="020B0604020202020204" pitchFamily="34" charset="0"/>
+              <a:buChar char="•"/>
+            </a:pPr>
+            <a:r>
+              <a:rPr lang="en-NZ" sz="2500" dirty="0"/>
+              <a:t>Hidden functionality in </a:t>
+            </a:r>
+            <a:r>
+              <a:rPr lang="en-NZ" sz="2500" dirty="0" smtClean="0"/>
+              <a:t>ancestors</a:t>
+            </a:r>
+            <a:endParaRPr lang="en-US" sz="2500" dirty="0" smtClean="0"/>
+          </a:p>
+          <a:p>
+            <a:pPr marL="1657350" lvl="2" indent="-742950">
+              <a:buFont typeface="Arial" panose="020B0604020202020204" pitchFamily="34" charset="0"/>
+              <a:buChar char="•"/>
+            </a:pPr>
+            <a:endParaRPr lang="en-US" sz="2500" dirty="0" smtClean="0"/>
+          </a:p>
+        </p:txBody>
+      </p:sp>
+    </p:spTree>
+    <p:extLst>
+      <p:ext uri="{BB962C8B-B14F-4D97-AF65-F5344CB8AC3E}">
+        <p14:creationId xmlns:p14="http://schemas.microsoft.com/office/powerpoint/2010/main" val="1281792996"/>
+      </p:ext>
+    </p:extLst>
+  </p:cSld>
+  <p:clrMapOvr>
+    <a:masterClrMapping/>
+  </p:clrMapOvr>
+  <p:timing>
+    <p:tnLst>
+      <p:par>
+        <p:cTn id="1" dur="indefinite" restart="never" nodeType="tmRoot"/>
+      </p:par>
+    </p:tnLst>
+  </p:timing>
+</p:sld>
+</file>
+
+<file path=ppt/slides/slide6.xml><?xml version="1.0" encoding="utf-8"?>
+<p:sld xmlns:a="http://schemas.openxmlformats.org/drawingml/2006/main" xmlns:r="http://schemas.openxmlformats.org/officeDocument/2006/relationships" xmlns:p="http://schemas.openxmlformats.org/presentationml/2006/main">
+  <p:cSld>
+    <p:bg>
+      <p:bgPr>
+        <a:solidFill>
+          <a:schemeClr val="accent5">
+            <a:lumMod val="60000"/>
+            <a:lumOff val="40000"/>
+          </a:schemeClr>
+        </a:solidFill>
+        <a:effectLst/>
+      </p:bgPr>
+    </p:bg>
+    <p:spTree>
+      <p:nvGrpSpPr>
+        <p:cNvPr id="1" name=""/>
+        <p:cNvGrpSpPr/>
+        <p:nvPr/>
+      </p:nvGrpSpPr>
+      <p:grpSpPr>
+        <a:xfrm>
+          <a:off x="0" y="0"/>
+          <a:ext cx="0" cy="0"/>
+          <a:chOff x="0" y="0"/>
+          <a:chExt cx="0" cy="0"/>
+        </a:xfrm>
+      </p:grpSpPr>
+      <p:sp>
+        <p:nvSpPr>
+          <p:cNvPr id="3" name="Rectangle 2"/>
+          <p:cNvSpPr/>
+          <p:nvPr/>
+        </p:nvSpPr>
+        <p:spPr>
+          <a:xfrm>
+            <a:off x="0" y="0"/>
+            <a:ext cx="9144000" cy="2015936"/>
+          </a:xfrm>
+          <a:prstGeom prst="rect">
+            <a:avLst/>
+          </a:prstGeom>
+        </p:spPr>
+        <p:txBody>
+          <a:bodyPr wrap="square">
+            <a:spAutoFit/>
+          </a:bodyPr>
+          <a:lstStyle/>
+          <a:p>
+            <a:pPr algn="ctr"/>
+            <a:endParaRPr lang="en-US" sz="4000" b="1" dirty="0"/>
+          </a:p>
+          <a:p>
+            <a:pPr lvl="1"/>
+            <a:r>
+              <a:rPr lang="en-NZ" sz="3500" b="1" dirty="0" smtClean="0"/>
+              <a:t>Don’t use inheritance</a:t>
+            </a:r>
+            <a:endParaRPr lang="en-US" sz="3500" b="1" dirty="0" smtClean="0"/>
+          </a:p>
+          <a:p>
+            <a:pPr marL="1657350" lvl="2" indent="-742950">
+              <a:buFont typeface="Arial" panose="020B0604020202020204" pitchFamily="34" charset="0"/>
+              <a:buChar char="•"/>
+            </a:pPr>
+            <a:endParaRPr lang="en-US" sz="2500" dirty="0" smtClean="0"/>
+          </a:p>
+          <a:p>
+            <a:pPr marL="1657350" lvl="2" indent="-742950">
+              <a:buFont typeface="Arial" panose="020B0604020202020204" pitchFamily="34" charset="0"/>
+              <a:buChar char="•"/>
+            </a:pPr>
+            <a:r>
+              <a:rPr lang="en-NZ" sz="2500" dirty="0"/>
+              <a:t>...when it isn’t a true </a:t>
+            </a:r>
+            <a:r>
+              <a:rPr lang="en-NZ" sz="2500" b="1" dirty="0"/>
+              <a:t>“is-a” </a:t>
+            </a:r>
+            <a:r>
+              <a:rPr lang="en-NZ" sz="2500" dirty="0" smtClean="0"/>
+              <a:t>relationship</a:t>
+            </a:r>
+            <a:endParaRPr lang="en-NZ" sz="2500" dirty="0"/>
+          </a:p>
+        </p:txBody>
+      </p:sp>
+    </p:spTree>
+    <p:extLst>
+      <p:ext uri="{BB962C8B-B14F-4D97-AF65-F5344CB8AC3E}">
+        <p14:creationId xmlns:p14="http://schemas.microsoft.com/office/powerpoint/2010/main" val="1216123497"/>
+      </p:ext>
+    </p:extLst>
+  </p:cSld>
+  <p:clrMapOvr>
+    <a:masterClrMapping/>
+  </p:clrMapOvr>
+  <p:timing>
+    <p:tnLst>
+      <p:par>
+        <p:cTn id="1" dur="indefinite" restart="never" nodeType="tmRoot"/>
+      </p:par>
+    </p:tnLst>
+  </p:timing>
+</p:sld>
+</file>
+
+<file path=ppt/slides/slide7.xml><?xml version="1.0" encoding="utf-8"?>
+<p:sld xmlns:a="http://schemas.openxmlformats.org/drawingml/2006/main" xmlns:r="http://schemas.openxmlformats.org/officeDocument/2006/relationships" xmlns:p="http://schemas.openxmlformats.org/presentationml/2006/main">
+  <p:cSld>
+    <p:bg>
+      <p:bgPr>
+        <a:solidFill>
+          <a:schemeClr val="accent5">
+            <a:lumMod val="60000"/>
+            <a:lumOff val="40000"/>
+          </a:schemeClr>
+        </a:solidFill>
+        <a:effectLst/>
+      </p:bgPr>
+    </p:bg>
+    <p:spTree>
+      <p:nvGrpSpPr>
+        <p:cNvPr id="1" name=""/>
+        <p:cNvGrpSpPr/>
+        <p:nvPr/>
+      </p:nvGrpSpPr>
+      <p:grpSpPr>
+        <a:xfrm>
+          <a:off x="0" y="0"/>
+          <a:ext cx="0" cy="0"/>
+          <a:chOff x="0" y="0"/>
+          <a:chExt cx="0" cy="0"/>
+        </a:xfrm>
+      </p:grpSpPr>
+      <p:sp>
+        <p:nvSpPr>
+          <p:cNvPr id="3" name="Rectangle 2"/>
+          <p:cNvSpPr/>
+          <p:nvPr/>
+        </p:nvSpPr>
+        <p:spPr>
+          <a:xfrm>
+            <a:off x="0" y="0"/>
+            <a:ext cx="9144000" cy="2015936"/>
+          </a:xfrm>
+          <a:prstGeom prst="rect">
+            <a:avLst/>
+          </a:prstGeom>
+        </p:spPr>
+        <p:txBody>
+          <a:bodyPr wrap="square">
+            <a:spAutoFit/>
+          </a:bodyPr>
+          <a:lstStyle/>
+          <a:p>
+            <a:pPr algn="ctr"/>
+            <a:endParaRPr lang="en-US" sz="4000" b="1" dirty="0"/>
+          </a:p>
+          <a:p>
+            <a:pPr lvl="1"/>
+            <a:r>
+              <a:rPr lang="en-NZ" sz="3500" b="1" dirty="0" smtClean="0"/>
+              <a:t>Practical</a:t>
+            </a:r>
+            <a:endParaRPr lang="en-US" sz="3500" b="1" dirty="0" smtClean="0"/>
+          </a:p>
+          <a:p>
+            <a:pPr marL="1657350" lvl="2" indent="-742950">
+              <a:buFont typeface="Arial" panose="020B0604020202020204" pitchFamily="34" charset="0"/>
+              <a:buChar char="•"/>
+            </a:pPr>
+            <a:endParaRPr lang="en-US" sz="2500" dirty="0" smtClean="0"/>
+          </a:p>
+          <a:p>
+            <a:pPr marL="1657350" lvl="2" indent="-742950">
+              <a:buFont typeface="Arial" panose="020B0604020202020204" pitchFamily="34" charset="0"/>
+              <a:buChar char="•"/>
+            </a:pPr>
+            <a:r>
+              <a:rPr lang="en-NZ" sz="2500" dirty="0" smtClean="0"/>
+              <a:t>Approach-avoid</a:t>
+            </a:r>
+            <a:endParaRPr lang="en-NZ" sz="2500" dirty="0"/>
+          </a:p>
+        </p:txBody>
+      </p:sp>
+      <p:pic>
+        <p:nvPicPr>
+          <p:cNvPr id="4" name="Picture 3"/>
+          <p:cNvPicPr>
+            <a:picLocks noChangeAspect="1" noChangeArrowheads="1"/>
+          </p:cNvPicPr>
+          <p:nvPr/>
+        </p:nvPicPr>
+        <p:blipFill rotWithShape="1">
+          <a:blip r:embed="rId3" cstate="print"/>
+          <a:srcRect l="1117" t="5895" r="1048" b="3401"/>
+          <a:stretch/>
+        </p:blipFill>
+        <p:spPr bwMode="auto">
+          <a:xfrm>
+            <a:off x="952500" y="2209800"/>
+            <a:ext cx="7239000" cy="3657600"/>
+          </a:xfrm>
+          <a:prstGeom prst="rect">
+            <a:avLst/>
+          </a:prstGeom>
+          <a:noFill/>
+          <a:ln w="9525">
+            <a:noFill/>
+            <a:miter lim="800000"/>
+            <a:headEnd/>
+            <a:tailEnd/>
+          </a:ln>
+        </p:spPr>
+      </p:pic>
+    </p:spTree>
+    <p:extLst>
+      <p:ext uri="{BB962C8B-B14F-4D97-AF65-F5344CB8AC3E}">
+        <p14:creationId xmlns:p14="http://schemas.microsoft.com/office/powerpoint/2010/main" val="2683406272"/>
+      </p:ext>
+    </p:extLst>
+  </p:cSld>
+  <p:clrMapOvr>
+    <a:masterClrMapping/>
+  </p:clrMapOvr>
+  <p:timing>
+    <p:tnLst>
+      <p:par>
+        <p:cTn id="1" dur="indefinite" restart="never" nodeType="tmRoot"/>
+      </p:par>
+    </p:tnLst>
+  </p:timing>
+</p:sld>
+</file>
+
+<file path=ppt/slides/slide8.xml><?xml version="1.0" encoding="utf-8"?>
+<p:sld xmlns:a="http://schemas.openxmlformats.org/drawingml/2006/main" xmlns:r="http://schemas.openxmlformats.org/officeDocument/2006/relationships" xmlns:p="http://schemas.openxmlformats.org/presentationml/2006/main">
+  <p:cSld>
+    <p:bg>
+      <p:bgPr>
+        <a:solidFill>
+          <a:schemeClr val="accent5">
+            <a:lumMod val="60000"/>
+            <a:lumOff val="40000"/>
+          </a:schemeClr>
+        </a:solidFill>
+        <a:effectLst/>
+      </p:bgPr>
+    </p:bg>
+    <p:spTree>
+      <p:nvGrpSpPr>
+        <p:cNvPr id="1" name=""/>
+        <p:cNvGrpSpPr/>
+        <p:nvPr/>
+      </p:nvGrpSpPr>
+      <p:grpSpPr>
+        <a:xfrm>
+          <a:off x="0" y="0"/>
+          <a:ext cx="0" cy="0"/>
+          <a:chOff x="0" y="0"/>
+          <a:chExt cx="0" cy="0"/>
+        </a:xfrm>
+      </p:grpSpPr>
+      <p:sp>
+        <p:nvSpPr>
+          <p:cNvPr id="3" name="Rectangle 2"/>
+          <p:cNvSpPr/>
+          <p:nvPr/>
+        </p:nvSpPr>
+        <p:spPr>
+          <a:xfrm>
+            <a:off x="0" y="0"/>
+            <a:ext cx="9144000" cy="6478697"/>
+          </a:xfrm>
+          <a:prstGeom prst="rect">
+            <a:avLst/>
+          </a:prstGeom>
+        </p:spPr>
+        <p:txBody>
+          <a:bodyPr wrap="square">
+            <a:spAutoFit/>
+          </a:bodyPr>
+          <a:lstStyle/>
+          <a:p>
+            <a:pPr algn="ctr"/>
+            <a:endParaRPr lang="en-US" sz="4000" b="1" dirty="0"/>
+          </a:p>
+          <a:p>
+            <a:pPr lvl="1"/>
+            <a:r>
+              <a:rPr lang="en-NZ" sz="3500" b="1" dirty="0" smtClean="0"/>
+              <a:t>Practical</a:t>
+            </a:r>
+            <a:endParaRPr lang="en-US" sz="3500" b="1" dirty="0" smtClean="0"/>
+          </a:p>
+          <a:p>
+            <a:pPr marL="1657350" lvl="2" indent="-742950">
+              <a:buFont typeface="Arial" panose="020B0604020202020204" pitchFamily="34" charset="0"/>
+              <a:buChar char="•"/>
+            </a:pPr>
+            <a:endParaRPr lang="en-US" sz="2500" dirty="0" smtClean="0"/>
+          </a:p>
+          <a:p>
+            <a:pPr marL="1657350" lvl="2" indent="-742950">
+              <a:buFont typeface="Arial" panose="020B0604020202020204" pitchFamily="34" charset="0"/>
+              <a:buChar char="•"/>
+            </a:pPr>
+            <a:r>
+              <a:rPr lang="en-NZ" sz="2500" dirty="0"/>
+              <a:t>Use Inheritance </a:t>
+            </a:r>
+            <a:r>
+              <a:rPr lang="en-NZ" sz="2500" b="1" dirty="0" err="1" smtClean="0"/>
+              <a:t>InheritanceApproachAvoid</a:t>
+            </a:r>
+            <a:r>
+              <a:rPr lang="en-NZ" sz="2500" b="1" dirty="0" smtClean="0"/>
+              <a:t> </a:t>
+            </a:r>
+            <a:r>
+              <a:rPr lang="en-NZ" sz="2500" b="1" dirty="0"/>
+              <a:t>Skeleton</a:t>
+            </a:r>
+          </a:p>
+          <a:p>
+            <a:pPr marL="1657350" lvl="2" indent="-742950">
+              <a:buFont typeface="Arial" panose="020B0604020202020204" pitchFamily="34" charset="0"/>
+              <a:buChar char="•"/>
+            </a:pPr>
+            <a:r>
+              <a:rPr lang="en-NZ" sz="2500" dirty="0"/>
+              <a:t>Carefully study the existing classes, </a:t>
+            </a:r>
+            <a:r>
+              <a:rPr lang="en-NZ" sz="2500" b="1" dirty="0"/>
+              <a:t>SimpleSprite</a:t>
+            </a:r>
+            <a:r>
+              <a:rPr lang="en-NZ" sz="2500" dirty="0"/>
+              <a:t>, </a:t>
+            </a:r>
+            <a:r>
+              <a:rPr lang="en-NZ" sz="2500" b="1" dirty="0" err="1"/>
+              <a:t>SpriteList</a:t>
+            </a:r>
+            <a:r>
+              <a:rPr lang="en-NZ" sz="2500" dirty="0"/>
+              <a:t> and </a:t>
+            </a:r>
+            <a:r>
+              <a:rPr lang="en-NZ" sz="2500" b="1" dirty="0"/>
+              <a:t>Form1</a:t>
+            </a:r>
+            <a:r>
+              <a:rPr lang="en-NZ" sz="2500" dirty="0"/>
+              <a:t>. Read the comments in </a:t>
+            </a:r>
+            <a:r>
+              <a:rPr lang="en-NZ" sz="2500" b="1" dirty="0"/>
+              <a:t>Form1.h</a:t>
+            </a:r>
+          </a:p>
+          <a:p>
+            <a:pPr marL="1657350" lvl="2" indent="-742950">
+              <a:buFont typeface="Arial" panose="020B0604020202020204" pitchFamily="34" charset="0"/>
+              <a:buChar char="•"/>
+            </a:pPr>
+            <a:r>
+              <a:rPr lang="en-NZ" sz="2500" dirty="0"/>
+              <a:t>Add two new classes </a:t>
+            </a:r>
+            <a:r>
+              <a:rPr lang="en-NZ" sz="2500" b="1" dirty="0"/>
+              <a:t>Approacher</a:t>
+            </a:r>
+            <a:r>
+              <a:rPr lang="en-NZ" sz="2500" dirty="0"/>
+              <a:t> and </a:t>
+            </a:r>
+            <a:r>
+              <a:rPr lang="en-NZ" sz="2500" b="1" dirty="0"/>
+              <a:t>Avoider</a:t>
+            </a:r>
+            <a:r>
+              <a:rPr lang="en-NZ" sz="2500" dirty="0"/>
+              <a:t>, both </a:t>
+            </a:r>
+            <a:r>
+              <a:rPr lang="en-NZ" sz="2500" dirty="0" smtClean="0"/>
+              <a:t>	descended from </a:t>
+            </a:r>
+            <a:r>
+              <a:rPr lang="en-NZ" sz="2500" b="1" dirty="0" smtClean="0"/>
+              <a:t>SimpleSprite</a:t>
+            </a:r>
+            <a:r>
+              <a:rPr lang="en-NZ" sz="2500" dirty="0" smtClean="0"/>
+              <a:t>, so that your </a:t>
+            </a:r>
+          </a:p>
+          <a:p>
+            <a:pPr lvl="2"/>
+            <a:r>
+              <a:rPr lang="en-NZ" sz="2500" dirty="0"/>
+              <a:t>	</a:t>
+            </a:r>
+            <a:r>
+              <a:rPr lang="en-NZ" sz="2500" dirty="0" smtClean="0"/>
+              <a:t>application runs as in the demo</a:t>
+            </a:r>
+            <a:endParaRPr lang="en-NZ" sz="2500" dirty="0"/>
+          </a:p>
+          <a:p>
+            <a:pPr marL="1657350" lvl="2" indent="-742950">
+              <a:buFont typeface="Arial" panose="020B0604020202020204" pitchFamily="34" charset="0"/>
+              <a:buChar char="•"/>
+            </a:pPr>
+            <a:r>
+              <a:rPr lang="en-NZ" sz="2500" dirty="0"/>
+              <a:t>Before creating your new child classes, decide:</a:t>
+            </a:r>
+          </a:p>
+          <a:p>
+            <a:pPr marL="2114550" lvl="3" indent="-742950">
+              <a:buFont typeface="Arial" panose="020B0604020202020204" pitchFamily="34" charset="0"/>
+              <a:buChar char="•"/>
+            </a:pPr>
+            <a:r>
+              <a:rPr lang="en-NZ" sz="2000" dirty="0"/>
+              <a:t>What data members and methods do they inherit from their parent?</a:t>
+            </a:r>
+          </a:p>
+          <a:p>
+            <a:pPr marL="2114550" lvl="3" indent="-742950">
+              <a:buFont typeface="Arial" panose="020B0604020202020204" pitchFamily="34" charset="0"/>
+              <a:buChar char="•"/>
+            </a:pPr>
+            <a:r>
+              <a:rPr lang="en-NZ" sz="2000" dirty="0"/>
+              <a:t>What additional data members (if any) do they each need?</a:t>
+            </a:r>
+          </a:p>
+          <a:p>
+            <a:pPr marL="2114550" lvl="3" indent="-742950">
+              <a:buFont typeface="Arial" panose="020B0604020202020204" pitchFamily="34" charset="0"/>
+              <a:buChar char="•"/>
+            </a:pPr>
+            <a:r>
+              <a:rPr lang="en-NZ" sz="2000" dirty="0"/>
+              <a:t>What additional methods (if any) do they each need?</a:t>
+            </a:r>
+          </a:p>
+          <a:p>
+            <a:pPr marL="2114550" lvl="3" indent="-742950">
+              <a:buFont typeface="Arial" panose="020B0604020202020204" pitchFamily="34" charset="0"/>
+              <a:buChar char="•"/>
+            </a:pPr>
+            <a:r>
+              <a:rPr lang="en-NZ" sz="2000" dirty="0"/>
+              <a:t>What inherited methods (if any) do they each need to override?</a:t>
+            </a:r>
+          </a:p>
+          <a:p>
+            <a:pPr marL="2114550" lvl="3" indent="-742950">
+              <a:buFont typeface="Arial" panose="020B0604020202020204" pitchFamily="34" charset="0"/>
+              <a:buChar char="•"/>
+            </a:pPr>
+            <a:r>
+              <a:rPr lang="en-NZ" sz="2000" dirty="0"/>
+              <a:t>If you are going to add methods or override inherited methods, what is the logic for each one?</a:t>
+            </a:r>
+          </a:p>
+        </p:txBody>
+      </p:sp>
+    </p:spTree>
+    <p:extLst>
+      <p:ext uri="{BB962C8B-B14F-4D97-AF65-F5344CB8AC3E}">
+        <p14:creationId xmlns:p14="http://schemas.microsoft.com/office/powerpoint/2010/main" val="242115439"/>
+      </p:ext>
+    </p:extLst>
+  </p:cSld>
+  <p:clrMapOvr>
+    <a:masterClrMapping/>
+  </p:clrMapOvr>
+  <p:timing>
+    <p:tnLst>
+      <p:par>
+        <p:cTn id="1" dur="indefinite" restart="never" nodeType="tmRoot"/>
+      </p:par>
+    </p:tnLst>
+  </p:timing>
 </p:sld>
 </file>
 
@@ -3524,4 +5932,265 @@
   <a:objectDefaults/>
   <a:extraClrSchemeLst/>
 </a:theme>
+</file>
+
+<file path=ppt/theme/theme2.xml><?xml version="1.0" encoding="utf-8"?>
+<a:theme xmlns:a="http://schemas.openxmlformats.org/drawingml/2006/main" name="Office Theme">
+  <a:themeElements>
+    <a:clrScheme name="Office">
+      <a:dk1>
+        <a:sysClr val="windowText" lastClr="000000"/>
+      </a:dk1>
+      <a:lt1>
+        <a:sysClr val="window" lastClr="FFFFFF"/>
+      </a:lt1>
+      <a:dk2>
+        <a:srgbClr val="44546A"/>
+      </a:dk2>
+      <a:lt2>
+        <a:srgbClr val="E7E6E6"/>
+      </a:lt2>
+      <a:accent1>
+        <a:srgbClr val="5B9BD5"/>
+      </a:accent1>
+      <a:accent2>
+        <a:srgbClr val="ED7D31"/>
+      </a:accent2>
+      <a:accent3>
+        <a:srgbClr val="A5A5A5"/>
+      </a:accent3>
+      <a:accent4>
+        <a:srgbClr val="FFC000"/>
+      </a:accent4>
+      <a:accent5>
+        <a:srgbClr val="4472C4"/>
+      </a:accent5>
+      <a:accent6>
+        <a:srgbClr val="70AD47"/>
+      </a:accent6>
+      <a:hlink>
+        <a:srgbClr val="0563C1"/>
+      </a:hlink>
+      <a:folHlink>
+        <a:srgbClr val="954F72"/>
+      </a:folHlink>
+    </a:clrScheme>
+    <a:fontScheme name="Office">
+      <a:majorFont>
+        <a:latin typeface="Calibri Light" panose="020F0302020204030204"/>
+        <a:ea typeface=""/>
+        <a:cs typeface=""/>
+        <a:font script="Jpan" typeface="游ゴシック Light"/>
+        <a:font script="Hang" typeface="맑은 고딕"/>
+        <a:font script="Hans" typeface="等线 Light"/>
+        <a:font script="Hant" typeface="新細明體"/>
+        <a:font script="Arab" typeface="Times New Roman"/>
+        <a:font script="Hebr" typeface="Times New Roman"/>
+        <a:font script="Thai" typeface="Angsana New"/>
+        <a:font script="Ethi" typeface="Nyala"/>
+        <a:font script="Beng" typeface="Vrinda"/>
+        <a:font script="Gujr" typeface="Shruti"/>
+        <a:font script="Khmr" typeface="MoolBoran"/>
+        <a:font script="Knda" typeface="Tunga"/>
+        <a:font script="Guru" typeface="Raavi"/>
+        <a:font script="Cans" typeface="Euphemia"/>
+        <a:font script="Cher" typeface="Plantagenet Cherokee"/>
+        <a:font script="Yiii" typeface="Microsoft Yi Baiti"/>
+        <a:font script="Tibt" typeface="Microsoft Himalaya"/>
+        <a:font script="Thaa" typeface="MV Boli"/>
+        <a:font script="Deva" typeface="Mangal"/>
+        <a:font script="Telu" typeface="Gautami"/>
+        <a:font script="Taml" typeface="Latha"/>
+        <a:font script="Syrc" typeface="Estrangelo Edessa"/>
+        <a:font script="Orya" typeface="Kalinga"/>
+        <a:font script="Mlym" typeface="Kartika"/>
+        <a:font script="Laoo" typeface="DokChampa"/>
+        <a:font script="Sinh" typeface="Iskoola Pota"/>
+        <a:font script="Mong" typeface="Mongolian Baiti"/>
+        <a:font script="Viet" typeface="Times New Roman"/>
+        <a:font script="Uigh" typeface="Microsoft Uighur"/>
+        <a:font script="Geor" typeface="Sylfaen"/>
+      </a:majorFont>
+      <a:minorFont>
+        <a:latin typeface="Calibri" panose="020F0502020204030204"/>
+        <a:ea typeface=""/>
+        <a:cs typeface=""/>
+        <a:font script="Jpan" typeface="游ゴシック"/>
+        <a:font script="Hang" typeface="맑은 고딕"/>
+        <a:font script="Hans" typeface="等线"/>
+        <a:font script="Hant" typeface="新細明體"/>
+        <a:font script="Arab" typeface="Arial"/>
+        <a:font script="Hebr" typeface="Arial"/>
+        <a:font script="Thai" typeface="Cordia New"/>
+        <a:font script="Ethi" typeface="Nyala"/>
+        <a:font script="Beng" typeface="Vrinda"/>
+        <a:font script="Gujr" typeface="Shruti"/>
+        <a:font script="Khmr" typeface="DaunPenh"/>
+        <a:font script="Knda" typeface="Tunga"/>
+        <a:font script="Guru" typeface="Raavi"/>
+        <a:font script="Cans" typeface="Euphemia"/>
+        <a:font script="Cher" typeface="Plantagenet Cherokee"/>
+        <a:font script="Yiii" typeface="Microsoft Yi Baiti"/>
+        <a:font script="Tibt" typeface="Microsoft Himalaya"/>
+        <a:font script="Thaa" typeface="MV Boli"/>
+        <a:font script="Deva" typeface="Mangal"/>
+        <a:font script="Telu" typeface="Gautami"/>
+        <a:font script="Taml" typeface="Latha"/>
+        <a:font script="Syrc" typeface="Estrangelo Edessa"/>
+        <a:font script="Orya" typeface="Kalinga"/>
+        <a:font script="Mlym" typeface="Kartika"/>
+        <a:font script="Laoo" typeface="DokChampa"/>
+        <a:font script="Sinh" typeface="Iskoola Pota"/>
+        <a:font script="Mong" typeface="Mongolian Baiti"/>
+        <a:font script="Viet" typeface="Arial"/>
+        <a:font script="Uigh" typeface="Microsoft Uighur"/>
+        <a:font script="Geor" typeface="Sylfaen"/>
+      </a:minorFont>
+    </a:fontScheme>
+    <a:fmtScheme name="Office">
+      <a:fillStyleLst>
+        <a:solidFill>
+          <a:schemeClr val="phClr"/>
+        </a:solidFill>
+        <a:gradFill rotWithShape="1">
+          <a:gsLst>
+            <a:gs pos="0">
+              <a:schemeClr val="phClr">
+                <a:lumMod val="110000"/>
+                <a:satMod val="105000"/>
+                <a:tint val="67000"/>
+              </a:schemeClr>
+            </a:gs>
+            <a:gs pos="50000">
+              <a:schemeClr val="phClr">
+                <a:lumMod val="105000"/>
+                <a:satMod val="103000"/>
+                <a:tint val="73000"/>
+              </a:schemeClr>
+            </a:gs>
+            <a:gs pos="100000">
+              <a:schemeClr val="phClr">
+                <a:lumMod val="105000"/>
+                <a:satMod val="109000"/>
+                <a:tint val="81000"/>
+              </a:schemeClr>
+            </a:gs>
+          </a:gsLst>
+          <a:lin ang="5400000" scaled="0"/>
+        </a:gradFill>
+        <a:gradFill rotWithShape="1">
+          <a:gsLst>
+            <a:gs pos="0">
+              <a:schemeClr val="phClr">
+                <a:satMod val="103000"/>
+                <a:lumMod val="102000"/>
+                <a:tint val="94000"/>
+              </a:schemeClr>
+            </a:gs>
+            <a:gs pos="50000">
+              <a:schemeClr val="phClr">
+                <a:satMod val="110000"/>
+                <a:lumMod val="100000"/>
+                <a:shade val="100000"/>
+              </a:schemeClr>
+            </a:gs>
+            <a:gs pos="100000">
+              <a:schemeClr val="phClr">
+                <a:lumMod val="99000"/>
+                <a:satMod val="120000"/>
+                <a:shade val="78000"/>
+              </a:schemeClr>
+            </a:gs>
+          </a:gsLst>
+          <a:lin ang="5400000" scaled="0"/>
+        </a:gradFill>
+      </a:fillStyleLst>
+      <a:lnStyleLst>
+        <a:ln w="6350" cap="flat" cmpd="sng" algn="ctr">
+          <a:solidFill>
+            <a:schemeClr val="phClr"/>
+          </a:solidFill>
+          <a:prstDash val="solid"/>
+          <a:miter lim="800000"/>
+        </a:ln>
+        <a:ln w="12700" cap="flat" cmpd="sng" algn="ctr">
+          <a:solidFill>
+            <a:schemeClr val="phClr"/>
+          </a:solidFill>
+          <a:prstDash val="solid"/>
+          <a:miter lim="800000"/>
+        </a:ln>
+        <a:ln w="19050" cap="flat" cmpd="sng" algn="ctr">
+          <a:solidFill>
+            <a:schemeClr val="phClr"/>
+          </a:solidFill>
+          <a:prstDash val="solid"/>
+          <a:miter lim="800000"/>
+        </a:ln>
+      </a:lnStyleLst>
+      <a:effectStyleLst>
+        <a:effectStyle>
+          <a:effectLst/>
+        </a:effectStyle>
+        <a:effectStyle>
+          <a:effectLst/>
+        </a:effectStyle>
+        <a:effectStyle>
+          <a:effectLst>
+            <a:outerShdw blurRad="57150" dist="19050" dir="5400000" algn="ctr" rotWithShape="0">
+              <a:srgbClr val="000000">
+                <a:alpha val="63000"/>
+              </a:srgbClr>
+            </a:outerShdw>
+          </a:effectLst>
+        </a:effectStyle>
+      </a:effectStyleLst>
+      <a:bgFillStyleLst>
+        <a:solidFill>
+          <a:schemeClr val="phClr"/>
+        </a:solidFill>
+        <a:solidFill>
+          <a:schemeClr val="phClr">
+            <a:tint val="95000"/>
+            <a:satMod val="170000"/>
+          </a:schemeClr>
+        </a:solidFill>
+        <a:gradFill rotWithShape="1">
+          <a:gsLst>
+            <a:gs pos="0">
+              <a:schemeClr val="phClr">
+                <a:tint val="93000"/>
+                <a:satMod val="150000"/>
+                <a:shade val="98000"/>
+                <a:lumMod val="102000"/>
+              </a:schemeClr>
+            </a:gs>
+            <a:gs pos="50000">
+              <a:schemeClr val="phClr">
+                <a:tint val="98000"/>
+                <a:satMod val="130000"/>
+                <a:shade val="90000"/>
+                <a:lumMod val="103000"/>
+              </a:schemeClr>
+            </a:gs>
+            <a:gs pos="100000">
+              <a:schemeClr val="phClr">
+                <a:shade val="63000"/>
+                <a:satMod val="120000"/>
+              </a:schemeClr>
+            </a:gs>
+          </a:gsLst>
+          <a:lin ang="5400000" scaled="0"/>
+        </a:gradFill>
+      </a:bgFillStyleLst>
+    </a:fmtScheme>
+  </a:themeElements>
+  <a:objectDefaults/>
+  <a:extraClrSchemeLst/>
+  <a:extLst>
+    <a:ext uri="{05A4C25C-085E-4340-85A3-A5531E510DB2}">
+      <thm15:themeFamily xmlns:thm15="http://schemas.microsoft.com/office/thememl/2012/main" name="Office Theme" id="{62F939B6-93AF-4DB8-9C6B-D6C7DFDC589F}" vid="{4A3C46E8-61CC-4603-A589-7422A47A8E4A}"/>
+    </a:ext>
+  </a:extLst>
+</a:theme>
 </file>
</xml_diff>